<commit_message>
Revert "[#9079] Set up basic REST API endpoint (#9130)"
This reverts commit 2878da2ca12ffe7038073d12f49923f8e20f06b0.
</commit_message>
<xml_diff>
--- a/docs/images/LogicComponent.pptx
+++ b/docs/images/LogicComponent.pptx
@@ -13,7 +13,7 @@
   <p:sldIdLst>
     <p:sldId id="256" r:id="rId2"/>
   </p:sldIdLst>
-  <p:sldSz cx="9144000" cy="6300788"/>
+  <p:sldSz cx="9144000" cy="7740650"/>
   <p:notesSz cx="6858000" cy="9144000"/>
   <p:defaultTextStyle>
     <a:defPPr>
@@ -113,7 +113,7 @@
   <p:extLst>
     <p:ext uri="{EFAFB233-063F-42B5-8137-9DF3F51BA10A}">
       <p15:sldGuideLst xmlns:p15="http://schemas.microsoft.com/office/powerpoint/2012/main">
-        <p15:guide id="1" orient="horz" pos="1985" userDrawn="1">
+        <p15:guide id="1" orient="horz" pos="2438" userDrawn="1">
           <p15:clr>
             <a:srgbClr val="A4A3A4"/>
           </p15:clr>
@@ -214,7 +214,7 @@
           <a:p>
             <a:fld id="{AC0A4F7A-2FF6-4B0C-9CFC-82AE92BD66AF}" type="datetimeFigureOut">
               <a:rPr lang="en-AU" smtClean="0"/>
-              <a:t>17/09/2018</a:t>
+              <a:t>28/01/2017</a:t>
             </a:fld>
             <a:endParaRPr lang="en-AU"/>
           </a:p>
@@ -380,7 +380,7 @@
             <a:fld id="{AF301891-4E62-472A-98E9-95DBD40531A4}" type="datetimeFigureOut">
               <a:rPr lang="en-SG" smtClean="0"/>
               <a:pPr/>
-              <a:t>17/9/2018</a:t>
+              <a:t>28/1/2017</a:t>
             </a:fld>
             <a:endParaRPr lang="en-SG"/>
           </a:p>
@@ -398,8 +398,8 @@
         </p:nvSpPr>
         <p:spPr>
           <a:xfrm>
-            <a:off x="941388" y="685800"/>
-            <a:ext cx="4975225" cy="3429000"/>
+            <a:off x="1403350" y="685800"/>
+            <a:ext cx="4051300" cy="3429000"/>
           </a:xfrm>
           <a:prstGeom prst="rect">
             <a:avLst/>
@@ -678,8 +678,8 @@
         </p:nvSpPr>
         <p:spPr>
           <a:xfrm>
-            <a:off x="941388" y="685800"/>
-            <a:ext cx="4975225" cy="3429000"/>
+            <a:off x="1403350" y="685800"/>
+            <a:ext cx="4051300" cy="3429000"/>
           </a:xfrm>
         </p:spPr>
       </p:sp>
@@ -768,8 +768,8 @@
         </p:nvSpPr>
         <p:spPr>
           <a:xfrm>
-            <a:off x="685800" y="1957332"/>
-            <a:ext cx="7772400" cy="1350586"/>
+            <a:off x="685800" y="2404621"/>
+            <a:ext cx="7772400" cy="1659223"/>
           </a:xfrm>
           <a:prstGeom prst="rect">
             <a:avLst/>
@@ -799,8 +799,8 @@
         </p:nvSpPr>
         <p:spPr>
           <a:xfrm>
-            <a:off x="1371600" y="3570447"/>
-            <a:ext cx="6400800" cy="1610201"/>
+            <a:off x="1371600" y="4386369"/>
+            <a:ext cx="6400800" cy="1978166"/>
           </a:xfrm>
           <a:prstGeom prst="rect">
             <a:avLst/>
@@ -839,7 +839,7 @@
                 </a:solidFill>
               </a:defRPr>
             </a:lvl3pPr>
-            <a:lvl4pPr marL="1371598" indent="0" algn="ctr">
+            <a:lvl4pPr marL="1371600" indent="0" algn="ctr">
               <a:buNone/>
               <a:defRPr>
                 <a:solidFill>
@@ -849,7 +849,7 @@
                 </a:solidFill>
               </a:defRPr>
             </a:lvl4pPr>
-            <a:lvl5pPr marL="1828798" indent="0" algn="ctr">
+            <a:lvl5pPr marL="1828800" indent="0" algn="ctr">
               <a:buNone/>
               <a:defRPr>
                 <a:solidFill>
@@ -859,7 +859,7 @@
                 </a:solidFill>
               </a:defRPr>
             </a:lvl5pPr>
-            <a:lvl6pPr marL="2285998" indent="0" algn="ctr">
+            <a:lvl6pPr marL="2286000" indent="0" algn="ctr">
               <a:buNone/>
               <a:defRPr>
                 <a:solidFill>
@@ -869,7 +869,7 @@
                 </a:solidFill>
               </a:defRPr>
             </a:lvl6pPr>
-            <a:lvl7pPr marL="2743198" indent="0" algn="ctr">
+            <a:lvl7pPr marL="2743200" indent="0" algn="ctr">
               <a:buNone/>
               <a:defRPr>
                 <a:solidFill>
@@ -879,7 +879,7 @@
                 </a:solidFill>
               </a:defRPr>
             </a:lvl7pPr>
-            <a:lvl8pPr marL="3200397" indent="0" algn="ctr">
+            <a:lvl8pPr marL="3200400" indent="0" algn="ctr">
               <a:buNone/>
               <a:defRPr>
                 <a:solidFill>
@@ -889,7 +889,7 @@
                 </a:solidFill>
               </a:defRPr>
             </a:lvl8pPr>
-            <a:lvl9pPr marL="3657596" indent="0" algn="ctr">
+            <a:lvl9pPr marL="3657600" indent="0" algn="ctr">
               <a:buNone/>
               <a:defRPr>
                 <a:solidFill>
@@ -921,8 +921,8 @@
         </p:nvSpPr>
         <p:spPr>
           <a:xfrm>
-            <a:off x="457200" y="5839899"/>
-            <a:ext cx="2133600" cy="335460"/>
+            <a:off x="457200" y="7174438"/>
+            <a:ext cx="2133600" cy="412118"/>
           </a:xfrm>
           <a:prstGeom prst="rect">
             <a:avLst/>
@@ -935,7 +935,7 @@
             <a:fld id="{1D8BD707-D9CF-40AE-B4C6-C98DA3205C09}" type="datetimeFigureOut">
               <a:rPr lang="en-US" smtClean="0"/>
               <a:pPr/>
-              <a:t>9/17/2018</a:t>
+              <a:t>1/28/2017</a:t>
             </a:fld>
             <a:endParaRPr lang="en-US"/>
           </a:p>
@@ -953,8 +953,8 @@
         </p:nvSpPr>
         <p:spPr>
           <a:xfrm>
-            <a:off x="3124200" y="5839899"/>
-            <a:ext cx="2895600" cy="335460"/>
+            <a:off x="3124200" y="7174438"/>
+            <a:ext cx="2895600" cy="412118"/>
           </a:xfrm>
           <a:prstGeom prst="rect">
             <a:avLst/>
@@ -980,8 +980,8 @@
         </p:nvSpPr>
         <p:spPr>
           <a:xfrm>
-            <a:off x="6553200" y="5839899"/>
-            <a:ext cx="2133600" cy="335460"/>
+            <a:off x="6553200" y="7174438"/>
+            <a:ext cx="2133600" cy="412118"/>
           </a:xfrm>
           <a:prstGeom prst="rect">
             <a:avLst/>
@@ -1044,8 +1044,8 @@
         </p:nvSpPr>
         <p:spPr>
           <a:xfrm>
-            <a:off x="457200" y="252325"/>
-            <a:ext cx="8229600" cy="1050132"/>
+            <a:off x="457200" y="309986"/>
+            <a:ext cx="8229600" cy="1290108"/>
           </a:xfrm>
           <a:prstGeom prst="rect">
             <a:avLst/>
@@ -1075,8 +1075,8 @@
         </p:nvSpPr>
         <p:spPr>
           <a:xfrm>
-            <a:off x="457200" y="1470188"/>
-            <a:ext cx="8229600" cy="4158229"/>
+            <a:off x="457200" y="1806152"/>
+            <a:ext cx="8229600" cy="5108471"/>
           </a:xfrm>
           <a:prstGeom prst="rect">
             <a:avLst/>
@@ -1135,8 +1135,8 @@
         </p:nvSpPr>
         <p:spPr>
           <a:xfrm>
-            <a:off x="457200" y="5839899"/>
-            <a:ext cx="2133600" cy="335460"/>
+            <a:off x="457200" y="7174438"/>
+            <a:ext cx="2133600" cy="412118"/>
           </a:xfrm>
           <a:prstGeom prst="rect">
             <a:avLst/>
@@ -1149,7 +1149,7 @@
             <a:fld id="{1D8BD707-D9CF-40AE-B4C6-C98DA3205C09}" type="datetimeFigureOut">
               <a:rPr lang="en-US" smtClean="0"/>
               <a:pPr/>
-              <a:t>9/17/2018</a:t>
+              <a:t>1/28/2017</a:t>
             </a:fld>
             <a:endParaRPr lang="en-US"/>
           </a:p>
@@ -1167,8 +1167,8 @@
         </p:nvSpPr>
         <p:spPr>
           <a:xfrm>
-            <a:off x="3124200" y="5839899"/>
-            <a:ext cx="2895600" cy="335460"/>
+            <a:off x="3124200" y="7174438"/>
+            <a:ext cx="2895600" cy="412118"/>
           </a:xfrm>
           <a:prstGeom prst="rect">
             <a:avLst/>
@@ -1194,8 +1194,8 @@
         </p:nvSpPr>
         <p:spPr>
           <a:xfrm>
-            <a:off x="6553200" y="5839899"/>
-            <a:ext cx="2133600" cy="335460"/>
+            <a:off x="6553200" y="7174438"/>
+            <a:ext cx="2133600" cy="412118"/>
           </a:xfrm>
           <a:prstGeom prst="rect">
             <a:avLst/>
@@ -1251,8 +1251,8 @@
         </p:nvSpPr>
         <p:spPr>
           <a:xfrm>
-            <a:off x="6629400" y="252328"/>
-            <a:ext cx="2057400" cy="5376089"/>
+            <a:off x="6629400" y="309988"/>
+            <a:ext cx="2057400" cy="6604638"/>
           </a:xfrm>
           <a:prstGeom prst="rect">
             <a:avLst/>
@@ -1282,8 +1282,8 @@
         </p:nvSpPr>
         <p:spPr>
           <a:xfrm>
-            <a:off x="457200" y="252328"/>
-            <a:ext cx="6019800" cy="5376089"/>
+            <a:off x="457200" y="309988"/>
+            <a:ext cx="6019800" cy="6604638"/>
           </a:xfrm>
           <a:prstGeom prst="rect">
             <a:avLst/>
@@ -1342,8 +1342,8 @@
         </p:nvSpPr>
         <p:spPr>
           <a:xfrm>
-            <a:off x="457200" y="5839899"/>
-            <a:ext cx="2133600" cy="335460"/>
+            <a:off x="457200" y="7174438"/>
+            <a:ext cx="2133600" cy="412118"/>
           </a:xfrm>
           <a:prstGeom prst="rect">
             <a:avLst/>
@@ -1356,7 +1356,7 @@
             <a:fld id="{1D8BD707-D9CF-40AE-B4C6-C98DA3205C09}" type="datetimeFigureOut">
               <a:rPr lang="en-US" smtClean="0"/>
               <a:pPr/>
-              <a:t>9/17/2018</a:t>
+              <a:t>1/28/2017</a:t>
             </a:fld>
             <a:endParaRPr lang="en-US"/>
           </a:p>
@@ -1374,8 +1374,8 @@
         </p:nvSpPr>
         <p:spPr>
           <a:xfrm>
-            <a:off x="3124200" y="5839899"/>
-            <a:ext cx="2895600" cy="335460"/>
+            <a:off x="3124200" y="7174438"/>
+            <a:ext cx="2895600" cy="412118"/>
           </a:xfrm>
           <a:prstGeom prst="rect">
             <a:avLst/>
@@ -1401,8 +1401,8 @@
         </p:nvSpPr>
         <p:spPr>
           <a:xfrm>
-            <a:off x="6553200" y="5839899"/>
-            <a:ext cx="2133600" cy="335460"/>
+            <a:off x="6553200" y="7174438"/>
+            <a:ext cx="2133600" cy="412118"/>
           </a:xfrm>
           <a:prstGeom prst="rect">
             <a:avLst/>
@@ -1458,8 +1458,8 @@
         </p:nvSpPr>
         <p:spPr>
           <a:xfrm>
-            <a:off x="457200" y="252325"/>
-            <a:ext cx="8229600" cy="1050132"/>
+            <a:off x="457200" y="309986"/>
+            <a:ext cx="8229600" cy="1290108"/>
           </a:xfrm>
           <a:prstGeom prst="rect">
             <a:avLst/>
@@ -1489,8 +1489,8 @@
         </p:nvSpPr>
         <p:spPr>
           <a:xfrm>
-            <a:off x="457200" y="1470188"/>
-            <a:ext cx="8229600" cy="4158229"/>
+            <a:off x="457200" y="1806152"/>
+            <a:ext cx="8229600" cy="5108471"/>
           </a:xfrm>
           <a:prstGeom prst="rect">
             <a:avLst/>
@@ -1549,8 +1549,8 @@
         </p:nvSpPr>
         <p:spPr>
           <a:xfrm>
-            <a:off x="457200" y="5839899"/>
-            <a:ext cx="2133600" cy="335460"/>
+            <a:off x="457200" y="7174438"/>
+            <a:ext cx="2133600" cy="412118"/>
           </a:xfrm>
           <a:prstGeom prst="rect">
             <a:avLst/>
@@ -1563,7 +1563,7 @@
             <a:fld id="{1D8BD707-D9CF-40AE-B4C6-C98DA3205C09}" type="datetimeFigureOut">
               <a:rPr lang="en-US" smtClean="0"/>
               <a:pPr/>
-              <a:t>9/17/2018</a:t>
+              <a:t>1/28/2017</a:t>
             </a:fld>
             <a:endParaRPr lang="en-US"/>
           </a:p>
@@ -1581,8 +1581,8 @@
         </p:nvSpPr>
         <p:spPr>
           <a:xfrm>
-            <a:off x="3124200" y="5839899"/>
-            <a:ext cx="2895600" cy="335460"/>
+            <a:off x="3124200" y="7174438"/>
+            <a:ext cx="2895600" cy="412118"/>
           </a:xfrm>
           <a:prstGeom prst="rect">
             <a:avLst/>
@@ -1608,8 +1608,8 @@
         </p:nvSpPr>
         <p:spPr>
           <a:xfrm>
-            <a:off x="6553200" y="5839899"/>
-            <a:ext cx="2133600" cy="335460"/>
+            <a:off x="6553200" y="7174438"/>
+            <a:ext cx="2133600" cy="412118"/>
           </a:xfrm>
           <a:prstGeom prst="rect">
             <a:avLst/>
@@ -1665,8 +1665,8 @@
         </p:nvSpPr>
         <p:spPr>
           <a:xfrm>
-            <a:off x="722313" y="4048842"/>
-            <a:ext cx="7772400" cy="1251407"/>
+            <a:off x="722313" y="4974086"/>
+            <a:ext cx="7772400" cy="1537379"/>
           </a:xfrm>
           <a:prstGeom prst="rect">
             <a:avLst/>
@@ -1700,8 +1700,8 @@
         </p:nvSpPr>
         <p:spPr>
           <a:xfrm>
-            <a:off x="722313" y="2670546"/>
-            <a:ext cx="7772400" cy="1378296"/>
+            <a:off x="722313" y="3280820"/>
+            <a:ext cx="7772400" cy="1693266"/>
           </a:xfrm>
           <a:prstGeom prst="rect">
             <a:avLst/>
@@ -1740,7 +1740,7 @@
                 </a:solidFill>
               </a:defRPr>
             </a:lvl3pPr>
-            <a:lvl4pPr marL="1371598" indent="0">
+            <a:lvl4pPr marL="1371600" indent="0">
               <a:buNone/>
               <a:defRPr sz="1400">
                 <a:solidFill>
@@ -1750,7 +1750,7 @@
                 </a:solidFill>
               </a:defRPr>
             </a:lvl4pPr>
-            <a:lvl5pPr marL="1828798" indent="0">
+            <a:lvl5pPr marL="1828800" indent="0">
               <a:buNone/>
               <a:defRPr sz="1400">
                 <a:solidFill>
@@ -1760,7 +1760,7 @@
                 </a:solidFill>
               </a:defRPr>
             </a:lvl5pPr>
-            <a:lvl6pPr marL="2285998" indent="0">
+            <a:lvl6pPr marL="2286000" indent="0">
               <a:buNone/>
               <a:defRPr sz="1400">
                 <a:solidFill>
@@ -1770,7 +1770,7 @@
                 </a:solidFill>
               </a:defRPr>
             </a:lvl6pPr>
-            <a:lvl7pPr marL="2743198" indent="0">
+            <a:lvl7pPr marL="2743200" indent="0">
               <a:buNone/>
               <a:defRPr sz="1400">
                 <a:solidFill>
@@ -1780,7 +1780,7 @@
                 </a:solidFill>
               </a:defRPr>
             </a:lvl7pPr>
-            <a:lvl8pPr marL="3200397" indent="0">
+            <a:lvl8pPr marL="3200400" indent="0">
               <a:buNone/>
               <a:defRPr sz="1400">
                 <a:solidFill>
@@ -1790,7 +1790,7 @@
                 </a:solidFill>
               </a:defRPr>
             </a:lvl8pPr>
-            <a:lvl9pPr marL="3657596" indent="0">
+            <a:lvl9pPr marL="3657600" indent="0">
               <a:buNone/>
               <a:defRPr sz="1400">
                 <a:solidFill>
@@ -1822,8 +1822,8 @@
         </p:nvSpPr>
         <p:spPr>
           <a:xfrm>
-            <a:off x="457200" y="5839899"/>
-            <a:ext cx="2133600" cy="335460"/>
+            <a:off x="457200" y="7174438"/>
+            <a:ext cx="2133600" cy="412118"/>
           </a:xfrm>
           <a:prstGeom prst="rect">
             <a:avLst/>
@@ -1836,7 +1836,7 @@
             <a:fld id="{1D8BD707-D9CF-40AE-B4C6-C98DA3205C09}" type="datetimeFigureOut">
               <a:rPr lang="en-US" smtClean="0"/>
               <a:pPr/>
-              <a:t>9/17/2018</a:t>
+              <a:t>1/28/2017</a:t>
             </a:fld>
             <a:endParaRPr lang="en-US"/>
           </a:p>
@@ -1854,8 +1854,8 @@
         </p:nvSpPr>
         <p:spPr>
           <a:xfrm>
-            <a:off x="3124200" y="5839899"/>
-            <a:ext cx="2895600" cy="335460"/>
+            <a:off x="3124200" y="7174438"/>
+            <a:ext cx="2895600" cy="412118"/>
           </a:xfrm>
           <a:prstGeom prst="rect">
             <a:avLst/>
@@ -1881,8 +1881,8 @@
         </p:nvSpPr>
         <p:spPr>
           <a:xfrm>
-            <a:off x="6553200" y="5839899"/>
-            <a:ext cx="2133600" cy="335460"/>
+            <a:off x="6553200" y="7174438"/>
+            <a:ext cx="2133600" cy="412118"/>
           </a:xfrm>
           <a:prstGeom prst="rect">
             <a:avLst/>
@@ -1938,8 +1938,8 @@
         </p:nvSpPr>
         <p:spPr>
           <a:xfrm>
-            <a:off x="457200" y="252325"/>
-            <a:ext cx="8229600" cy="1050132"/>
+            <a:off x="457200" y="309986"/>
+            <a:ext cx="8229600" cy="1290108"/>
           </a:xfrm>
           <a:prstGeom prst="rect">
             <a:avLst/>
@@ -1969,8 +1969,8 @@
         </p:nvSpPr>
         <p:spPr>
           <a:xfrm>
-            <a:off x="457200" y="1470188"/>
-            <a:ext cx="4038600" cy="4158229"/>
+            <a:off x="457200" y="1806152"/>
+            <a:ext cx="4038600" cy="5108471"/>
           </a:xfrm>
           <a:prstGeom prst="rect">
             <a:avLst/>
@@ -2057,8 +2057,8 @@
         </p:nvSpPr>
         <p:spPr>
           <a:xfrm>
-            <a:off x="4648200" y="1470188"/>
-            <a:ext cx="4038600" cy="4158229"/>
+            <a:off x="4648200" y="1806152"/>
+            <a:ext cx="4038600" cy="5108471"/>
           </a:xfrm>
           <a:prstGeom prst="rect">
             <a:avLst/>
@@ -2145,8 +2145,8 @@
         </p:nvSpPr>
         <p:spPr>
           <a:xfrm>
-            <a:off x="457200" y="5839899"/>
-            <a:ext cx="2133600" cy="335460"/>
+            <a:off x="457200" y="7174438"/>
+            <a:ext cx="2133600" cy="412118"/>
           </a:xfrm>
           <a:prstGeom prst="rect">
             <a:avLst/>
@@ -2159,7 +2159,7 @@
             <a:fld id="{1D8BD707-D9CF-40AE-B4C6-C98DA3205C09}" type="datetimeFigureOut">
               <a:rPr lang="en-US" smtClean="0"/>
               <a:pPr/>
-              <a:t>9/17/2018</a:t>
+              <a:t>1/28/2017</a:t>
             </a:fld>
             <a:endParaRPr lang="en-US"/>
           </a:p>
@@ -2177,8 +2177,8 @@
         </p:nvSpPr>
         <p:spPr>
           <a:xfrm>
-            <a:off x="3124200" y="5839899"/>
-            <a:ext cx="2895600" cy="335460"/>
+            <a:off x="3124200" y="7174438"/>
+            <a:ext cx="2895600" cy="412118"/>
           </a:xfrm>
           <a:prstGeom prst="rect">
             <a:avLst/>
@@ -2204,8 +2204,8 @@
         </p:nvSpPr>
         <p:spPr>
           <a:xfrm>
-            <a:off x="6553200" y="5839899"/>
-            <a:ext cx="2133600" cy="335460"/>
+            <a:off x="6553200" y="7174438"/>
+            <a:ext cx="2133600" cy="412118"/>
           </a:xfrm>
           <a:prstGeom prst="rect">
             <a:avLst/>
@@ -2261,8 +2261,8 @@
         </p:nvSpPr>
         <p:spPr>
           <a:xfrm>
-            <a:off x="457200" y="252325"/>
-            <a:ext cx="8229600" cy="1050132"/>
+            <a:off x="457200" y="309986"/>
+            <a:ext cx="8229600" cy="1290108"/>
           </a:xfrm>
           <a:prstGeom prst="rect">
             <a:avLst/>
@@ -2296,8 +2296,8 @@
         </p:nvSpPr>
         <p:spPr>
           <a:xfrm>
-            <a:off x="457200" y="1410389"/>
-            <a:ext cx="4040188" cy="587781"/>
+            <a:off x="457200" y="1732688"/>
+            <a:ext cx="4040188" cy="722102"/>
           </a:xfrm>
           <a:prstGeom prst="rect">
             <a:avLst/>
@@ -2318,27 +2318,27 @@
               <a:buNone/>
               <a:defRPr sz="1800" b="1"/>
             </a:lvl3pPr>
-            <a:lvl4pPr marL="1371598" indent="0">
+            <a:lvl4pPr marL="1371600" indent="0">
               <a:buNone/>
               <a:defRPr sz="1600" b="1"/>
             </a:lvl4pPr>
-            <a:lvl5pPr marL="1828798" indent="0">
+            <a:lvl5pPr marL="1828800" indent="0">
               <a:buNone/>
               <a:defRPr sz="1600" b="1"/>
             </a:lvl5pPr>
-            <a:lvl6pPr marL="2285998" indent="0">
+            <a:lvl6pPr marL="2286000" indent="0">
               <a:buNone/>
               <a:defRPr sz="1600" b="1"/>
             </a:lvl6pPr>
-            <a:lvl7pPr marL="2743198" indent="0">
+            <a:lvl7pPr marL="2743200" indent="0">
               <a:buNone/>
               <a:defRPr sz="1600" b="1"/>
             </a:lvl7pPr>
-            <a:lvl8pPr marL="3200397" indent="0">
+            <a:lvl8pPr marL="3200400" indent="0">
               <a:buNone/>
               <a:defRPr sz="1600" b="1"/>
             </a:lvl8pPr>
-            <a:lvl9pPr marL="3657596" indent="0">
+            <a:lvl9pPr marL="3657600" indent="0">
               <a:buNone/>
               <a:defRPr sz="1600" b="1"/>
             </a:lvl9pPr>
@@ -2364,8 +2364,8 @@
         </p:nvSpPr>
         <p:spPr>
           <a:xfrm>
-            <a:off x="457200" y="1998170"/>
-            <a:ext cx="4040188" cy="3630247"/>
+            <a:off x="457200" y="2454790"/>
+            <a:ext cx="4040188" cy="4459833"/>
           </a:xfrm>
           <a:prstGeom prst="rect">
             <a:avLst/>
@@ -2452,8 +2452,8 @@
         </p:nvSpPr>
         <p:spPr>
           <a:xfrm>
-            <a:off x="4645033" y="1410389"/>
-            <a:ext cx="4041775" cy="587781"/>
+            <a:off x="4645029" y="1732688"/>
+            <a:ext cx="4041775" cy="722102"/>
           </a:xfrm>
           <a:prstGeom prst="rect">
             <a:avLst/>
@@ -2474,27 +2474,27 @@
               <a:buNone/>
               <a:defRPr sz="1800" b="1"/>
             </a:lvl3pPr>
-            <a:lvl4pPr marL="1371598" indent="0">
+            <a:lvl4pPr marL="1371600" indent="0">
               <a:buNone/>
               <a:defRPr sz="1600" b="1"/>
             </a:lvl4pPr>
-            <a:lvl5pPr marL="1828798" indent="0">
+            <a:lvl5pPr marL="1828800" indent="0">
               <a:buNone/>
               <a:defRPr sz="1600" b="1"/>
             </a:lvl5pPr>
-            <a:lvl6pPr marL="2285998" indent="0">
+            <a:lvl6pPr marL="2286000" indent="0">
               <a:buNone/>
               <a:defRPr sz="1600" b="1"/>
             </a:lvl6pPr>
-            <a:lvl7pPr marL="2743198" indent="0">
+            <a:lvl7pPr marL="2743200" indent="0">
               <a:buNone/>
               <a:defRPr sz="1600" b="1"/>
             </a:lvl7pPr>
-            <a:lvl8pPr marL="3200397" indent="0">
+            <a:lvl8pPr marL="3200400" indent="0">
               <a:buNone/>
               <a:defRPr sz="1600" b="1"/>
             </a:lvl8pPr>
-            <a:lvl9pPr marL="3657596" indent="0">
+            <a:lvl9pPr marL="3657600" indent="0">
               <a:buNone/>
               <a:defRPr sz="1600" b="1"/>
             </a:lvl9pPr>
@@ -2520,8 +2520,8 @@
         </p:nvSpPr>
         <p:spPr>
           <a:xfrm>
-            <a:off x="4645033" y="1998170"/>
-            <a:ext cx="4041775" cy="3630247"/>
+            <a:off x="4645029" y="2454790"/>
+            <a:ext cx="4041775" cy="4459833"/>
           </a:xfrm>
           <a:prstGeom prst="rect">
             <a:avLst/>
@@ -2608,8 +2608,8 @@
         </p:nvSpPr>
         <p:spPr>
           <a:xfrm>
-            <a:off x="457200" y="5839899"/>
-            <a:ext cx="2133600" cy="335460"/>
+            <a:off x="457200" y="7174438"/>
+            <a:ext cx="2133600" cy="412118"/>
           </a:xfrm>
           <a:prstGeom prst="rect">
             <a:avLst/>
@@ -2622,7 +2622,7 @@
             <a:fld id="{1D8BD707-D9CF-40AE-B4C6-C98DA3205C09}" type="datetimeFigureOut">
               <a:rPr lang="en-US" smtClean="0"/>
               <a:pPr/>
-              <a:t>9/17/2018</a:t>
+              <a:t>1/28/2017</a:t>
             </a:fld>
             <a:endParaRPr lang="en-US"/>
           </a:p>
@@ -2640,8 +2640,8 @@
         </p:nvSpPr>
         <p:spPr>
           <a:xfrm>
-            <a:off x="3124200" y="5839899"/>
-            <a:ext cx="2895600" cy="335460"/>
+            <a:off x="3124200" y="7174438"/>
+            <a:ext cx="2895600" cy="412118"/>
           </a:xfrm>
           <a:prstGeom prst="rect">
             <a:avLst/>
@@ -2667,8 +2667,8 @@
         </p:nvSpPr>
         <p:spPr>
           <a:xfrm>
-            <a:off x="6553200" y="5839899"/>
-            <a:ext cx="2133600" cy="335460"/>
+            <a:off x="6553200" y="7174438"/>
+            <a:ext cx="2133600" cy="412118"/>
           </a:xfrm>
           <a:prstGeom prst="rect">
             <a:avLst/>
@@ -2724,8 +2724,8 @@
         </p:nvSpPr>
         <p:spPr>
           <a:xfrm>
-            <a:off x="457200" y="252325"/>
-            <a:ext cx="8229600" cy="1050132"/>
+            <a:off x="457200" y="309986"/>
+            <a:ext cx="8229600" cy="1290108"/>
           </a:xfrm>
           <a:prstGeom prst="rect">
             <a:avLst/>
@@ -2755,8 +2755,8 @@
         </p:nvSpPr>
         <p:spPr>
           <a:xfrm>
-            <a:off x="457200" y="5839899"/>
-            <a:ext cx="2133600" cy="335460"/>
+            <a:off x="457200" y="7174438"/>
+            <a:ext cx="2133600" cy="412118"/>
           </a:xfrm>
           <a:prstGeom prst="rect">
             <a:avLst/>
@@ -2769,7 +2769,7 @@
             <a:fld id="{1D8BD707-D9CF-40AE-B4C6-C98DA3205C09}" type="datetimeFigureOut">
               <a:rPr lang="en-US" smtClean="0"/>
               <a:pPr/>
-              <a:t>9/17/2018</a:t>
+              <a:t>1/28/2017</a:t>
             </a:fld>
             <a:endParaRPr lang="en-US"/>
           </a:p>
@@ -2787,8 +2787,8 @@
         </p:nvSpPr>
         <p:spPr>
           <a:xfrm>
-            <a:off x="3124200" y="5839899"/>
-            <a:ext cx="2895600" cy="335460"/>
+            <a:off x="3124200" y="7174438"/>
+            <a:ext cx="2895600" cy="412118"/>
           </a:xfrm>
           <a:prstGeom prst="rect">
             <a:avLst/>
@@ -2814,8 +2814,8 @@
         </p:nvSpPr>
         <p:spPr>
           <a:xfrm>
-            <a:off x="6553200" y="5839899"/>
-            <a:ext cx="2133600" cy="335460"/>
+            <a:off x="6553200" y="7174438"/>
+            <a:ext cx="2133600" cy="412118"/>
           </a:xfrm>
           <a:prstGeom prst="rect">
             <a:avLst/>
@@ -2871,8 +2871,8 @@
         </p:nvSpPr>
         <p:spPr>
           <a:xfrm>
-            <a:off x="457200" y="5839899"/>
-            <a:ext cx="2133600" cy="335460"/>
+            <a:off x="457200" y="7174438"/>
+            <a:ext cx="2133600" cy="412118"/>
           </a:xfrm>
           <a:prstGeom prst="rect">
             <a:avLst/>
@@ -2885,7 +2885,7 @@
             <a:fld id="{1D8BD707-D9CF-40AE-B4C6-C98DA3205C09}" type="datetimeFigureOut">
               <a:rPr lang="en-US" smtClean="0"/>
               <a:pPr/>
-              <a:t>9/17/2018</a:t>
+              <a:t>1/28/2017</a:t>
             </a:fld>
             <a:endParaRPr lang="en-US"/>
           </a:p>
@@ -2903,8 +2903,8 @@
         </p:nvSpPr>
         <p:spPr>
           <a:xfrm>
-            <a:off x="3124200" y="5839899"/>
-            <a:ext cx="2895600" cy="335460"/>
+            <a:off x="3124200" y="7174438"/>
+            <a:ext cx="2895600" cy="412118"/>
           </a:xfrm>
           <a:prstGeom prst="rect">
             <a:avLst/>
@@ -2930,8 +2930,8 @@
         </p:nvSpPr>
         <p:spPr>
           <a:xfrm>
-            <a:off x="6553200" y="5839899"/>
-            <a:ext cx="2133600" cy="335460"/>
+            <a:off x="6553200" y="7174438"/>
+            <a:ext cx="2133600" cy="412118"/>
           </a:xfrm>
           <a:prstGeom prst="rect">
             <a:avLst/>
@@ -2987,8 +2987,8 @@
         </p:nvSpPr>
         <p:spPr>
           <a:xfrm>
-            <a:off x="457210" y="250866"/>
-            <a:ext cx="3008313" cy="1067633"/>
+            <a:off x="457203" y="308192"/>
+            <a:ext cx="3008313" cy="1311610"/>
           </a:xfrm>
           <a:prstGeom prst="rect">
             <a:avLst/>
@@ -3022,8 +3022,8 @@
         </p:nvSpPr>
         <p:spPr>
           <a:xfrm>
-            <a:off x="3575050" y="250868"/>
-            <a:ext cx="5111750" cy="5377548"/>
+            <a:off x="3575050" y="308194"/>
+            <a:ext cx="5111750" cy="6606431"/>
           </a:xfrm>
           <a:prstGeom prst="rect">
             <a:avLst/>
@@ -3110,8 +3110,8 @@
         </p:nvSpPr>
         <p:spPr>
           <a:xfrm>
-            <a:off x="457210" y="1318503"/>
-            <a:ext cx="3008313" cy="4309915"/>
+            <a:off x="457203" y="1619804"/>
+            <a:ext cx="3008313" cy="5294821"/>
           </a:xfrm>
           <a:prstGeom prst="rect">
             <a:avLst/>
@@ -3132,27 +3132,27 @@
               <a:buNone/>
               <a:defRPr sz="1000"/>
             </a:lvl3pPr>
-            <a:lvl4pPr marL="1371598" indent="0">
+            <a:lvl4pPr marL="1371600" indent="0">
               <a:buNone/>
               <a:defRPr sz="900"/>
             </a:lvl4pPr>
-            <a:lvl5pPr marL="1828798" indent="0">
+            <a:lvl5pPr marL="1828800" indent="0">
               <a:buNone/>
               <a:defRPr sz="900"/>
             </a:lvl5pPr>
-            <a:lvl6pPr marL="2285998" indent="0">
+            <a:lvl6pPr marL="2286000" indent="0">
               <a:buNone/>
               <a:defRPr sz="900"/>
             </a:lvl6pPr>
-            <a:lvl7pPr marL="2743198" indent="0">
+            <a:lvl7pPr marL="2743200" indent="0">
               <a:buNone/>
               <a:defRPr sz="900"/>
             </a:lvl7pPr>
-            <a:lvl8pPr marL="3200397" indent="0">
+            <a:lvl8pPr marL="3200400" indent="0">
               <a:buNone/>
               <a:defRPr sz="900"/>
             </a:lvl8pPr>
-            <a:lvl9pPr marL="3657596" indent="0">
+            <a:lvl9pPr marL="3657600" indent="0">
               <a:buNone/>
               <a:defRPr sz="900"/>
             </a:lvl9pPr>
@@ -3178,8 +3178,8 @@
         </p:nvSpPr>
         <p:spPr>
           <a:xfrm>
-            <a:off x="457200" y="5839899"/>
-            <a:ext cx="2133600" cy="335460"/>
+            <a:off x="457200" y="7174438"/>
+            <a:ext cx="2133600" cy="412118"/>
           </a:xfrm>
           <a:prstGeom prst="rect">
             <a:avLst/>
@@ -3192,7 +3192,7 @@
             <a:fld id="{1D8BD707-D9CF-40AE-B4C6-C98DA3205C09}" type="datetimeFigureOut">
               <a:rPr lang="en-US" smtClean="0"/>
               <a:pPr/>
-              <a:t>9/17/2018</a:t>
+              <a:t>1/28/2017</a:t>
             </a:fld>
             <a:endParaRPr lang="en-US"/>
           </a:p>
@@ -3210,8 +3210,8 @@
         </p:nvSpPr>
         <p:spPr>
           <a:xfrm>
-            <a:off x="3124200" y="5839899"/>
-            <a:ext cx="2895600" cy="335460"/>
+            <a:off x="3124200" y="7174438"/>
+            <a:ext cx="2895600" cy="412118"/>
           </a:xfrm>
           <a:prstGeom prst="rect">
             <a:avLst/>
@@ -3237,8 +3237,8 @@
         </p:nvSpPr>
         <p:spPr>
           <a:xfrm>
-            <a:off x="6553200" y="5839899"/>
-            <a:ext cx="2133600" cy="335460"/>
+            <a:off x="6553200" y="7174438"/>
+            <a:ext cx="2133600" cy="412118"/>
           </a:xfrm>
           <a:prstGeom prst="rect">
             <a:avLst/>
@@ -3294,8 +3294,8 @@
         </p:nvSpPr>
         <p:spPr>
           <a:xfrm>
-            <a:off x="1792288" y="4410552"/>
-            <a:ext cx="5486400" cy="520691"/>
+            <a:off x="1792288" y="5418455"/>
+            <a:ext cx="5486400" cy="639680"/>
           </a:xfrm>
           <a:prstGeom prst="rect">
             <a:avLst/>
@@ -3329,8 +3329,8 @@
         </p:nvSpPr>
         <p:spPr>
           <a:xfrm>
-            <a:off x="1792288" y="562989"/>
-            <a:ext cx="5486400" cy="3780473"/>
+            <a:off x="1792288" y="691642"/>
+            <a:ext cx="5486400" cy="4644390"/>
           </a:xfrm>
           <a:prstGeom prst="rect">
             <a:avLst/>
@@ -3351,27 +3351,27 @@
               <a:buNone/>
               <a:defRPr sz="2400"/>
             </a:lvl3pPr>
-            <a:lvl4pPr marL="1371598" indent="0">
+            <a:lvl4pPr marL="1371600" indent="0">
               <a:buNone/>
               <a:defRPr sz="2000"/>
             </a:lvl4pPr>
-            <a:lvl5pPr marL="1828798" indent="0">
+            <a:lvl5pPr marL="1828800" indent="0">
               <a:buNone/>
               <a:defRPr sz="2000"/>
             </a:lvl5pPr>
-            <a:lvl6pPr marL="2285998" indent="0">
+            <a:lvl6pPr marL="2286000" indent="0">
               <a:buNone/>
               <a:defRPr sz="2000"/>
             </a:lvl6pPr>
-            <a:lvl7pPr marL="2743198" indent="0">
+            <a:lvl7pPr marL="2743200" indent="0">
               <a:buNone/>
               <a:defRPr sz="2000"/>
             </a:lvl7pPr>
-            <a:lvl8pPr marL="3200397" indent="0">
+            <a:lvl8pPr marL="3200400" indent="0">
               <a:buNone/>
               <a:defRPr sz="2000"/>
             </a:lvl8pPr>
-            <a:lvl9pPr marL="3657596" indent="0">
+            <a:lvl9pPr marL="3657600" indent="0">
               <a:buNone/>
               <a:defRPr sz="2000"/>
             </a:lvl9pPr>
@@ -3393,8 +3393,8 @@
         </p:nvSpPr>
         <p:spPr>
           <a:xfrm>
-            <a:off x="1792288" y="4931245"/>
-            <a:ext cx="5486400" cy="739466"/>
+            <a:off x="1792288" y="6058135"/>
+            <a:ext cx="5486400" cy="908450"/>
           </a:xfrm>
           <a:prstGeom prst="rect">
             <a:avLst/>
@@ -3415,27 +3415,27 @@
               <a:buNone/>
               <a:defRPr sz="1000"/>
             </a:lvl3pPr>
-            <a:lvl4pPr marL="1371598" indent="0">
+            <a:lvl4pPr marL="1371600" indent="0">
               <a:buNone/>
               <a:defRPr sz="900"/>
             </a:lvl4pPr>
-            <a:lvl5pPr marL="1828798" indent="0">
+            <a:lvl5pPr marL="1828800" indent="0">
               <a:buNone/>
               <a:defRPr sz="900"/>
             </a:lvl5pPr>
-            <a:lvl6pPr marL="2285998" indent="0">
+            <a:lvl6pPr marL="2286000" indent="0">
               <a:buNone/>
               <a:defRPr sz="900"/>
             </a:lvl6pPr>
-            <a:lvl7pPr marL="2743198" indent="0">
+            <a:lvl7pPr marL="2743200" indent="0">
               <a:buNone/>
               <a:defRPr sz="900"/>
             </a:lvl7pPr>
-            <a:lvl8pPr marL="3200397" indent="0">
+            <a:lvl8pPr marL="3200400" indent="0">
               <a:buNone/>
               <a:defRPr sz="900"/>
             </a:lvl8pPr>
-            <a:lvl9pPr marL="3657596" indent="0">
+            <a:lvl9pPr marL="3657600" indent="0">
               <a:buNone/>
               <a:defRPr sz="900"/>
             </a:lvl9pPr>
@@ -3461,8 +3461,8 @@
         </p:nvSpPr>
         <p:spPr>
           <a:xfrm>
-            <a:off x="457200" y="5839899"/>
-            <a:ext cx="2133600" cy="335460"/>
+            <a:off x="457200" y="7174438"/>
+            <a:ext cx="2133600" cy="412118"/>
           </a:xfrm>
           <a:prstGeom prst="rect">
             <a:avLst/>
@@ -3475,7 +3475,7 @@
             <a:fld id="{1D8BD707-D9CF-40AE-B4C6-C98DA3205C09}" type="datetimeFigureOut">
               <a:rPr lang="en-US" smtClean="0"/>
               <a:pPr/>
-              <a:t>9/17/2018</a:t>
+              <a:t>1/28/2017</a:t>
             </a:fld>
             <a:endParaRPr lang="en-US"/>
           </a:p>
@@ -3493,8 +3493,8 @@
         </p:nvSpPr>
         <p:spPr>
           <a:xfrm>
-            <a:off x="3124200" y="5839899"/>
-            <a:ext cx="2895600" cy="335460"/>
+            <a:off x="3124200" y="7174438"/>
+            <a:ext cx="2895600" cy="412118"/>
           </a:xfrm>
           <a:prstGeom prst="rect">
             <a:avLst/>
@@ -3520,8 +3520,8 @@
         </p:nvSpPr>
         <p:spPr>
           <a:xfrm>
-            <a:off x="6553200" y="5839899"/>
-            <a:ext cx="2133600" cy="335460"/>
+            <a:off x="6553200" y="7174438"/>
+            <a:ext cx="2133600" cy="412118"/>
           </a:xfrm>
           <a:prstGeom prst="rect">
             <a:avLst/>
@@ -3578,8 +3578,8 @@
         </p:nvSpPr>
         <p:spPr>
           <a:xfrm>
-            <a:off x="1066800" y="217886"/>
-            <a:ext cx="6781800" cy="5751908"/>
+            <a:off x="1066800" y="267675"/>
+            <a:ext cx="6781800" cy="6717534"/>
           </a:xfrm>
           <a:prstGeom prst="roundRect">
             <a:avLst>
@@ -3637,10 +3637,10 @@
         </p:nvGrpSpPr>
         <p:grpSpPr>
           <a:xfrm>
-            <a:off x="1251698" y="602275"/>
-            <a:ext cx="6439261" cy="2929120"/>
+            <a:off x="1251691" y="739907"/>
+            <a:ext cx="6439261" cy="2834304"/>
             <a:chOff x="-1433735" y="1531517"/>
-            <a:chExt cx="2576734" cy="5167398"/>
+            <a:chExt cx="2576734" cy="4070038"/>
           </a:xfrm>
           <a:solidFill>
             <a:schemeClr val="bg1"/>
@@ -3654,8 +3654,8 @@
           </p:nvSpPr>
           <p:spPr>
             <a:xfrm>
-              <a:off x="-1433735" y="1797512"/>
-              <a:ext cx="2576734" cy="4901403"/>
+              <a:off x="-1433735" y="1797511"/>
+              <a:ext cx="2576734" cy="3804044"/>
             </a:xfrm>
             <a:prstGeom prst="rect">
               <a:avLst/>
@@ -3773,10 +3773,10 @@
         </p:nvGrpSpPr>
         <p:grpSpPr>
           <a:xfrm>
-            <a:off x="1251697" y="3759995"/>
-            <a:ext cx="6439259" cy="1752599"/>
-            <a:chOff x="-613660" y="1232995"/>
-            <a:chExt cx="1756659" cy="3375270"/>
+            <a:off x="1250576" y="3840827"/>
+            <a:ext cx="6440373" cy="1685259"/>
+            <a:chOff x="-613964" y="1232995"/>
+            <a:chExt cx="1756963" cy="2641862"/>
           </a:xfrm>
           <a:solidFill>
             <a:schemeClr val="bg1"/>
@@ -3790,8 +3790,8 @@
           </p:nvSpPr>
           <p:spPr>
             <a:xfrm>
-              <a:off x="-613660" y="1523997"/>
-              <a:ext cx="1756659" cy="3084268"/>
+              <a:off x="-613964" y="1523999"/>
+              <a:ext cx="1756963" cy="2350858"/>
             </a:xfrm>
             <a:prstGeom prst="rect">
               <a:avLst/>
@@ -3919,8 +3919,8 @@
         </p:nvSpPr>
         <p:spPr>
           <a:xfrm>
-            <a:off x="8077200" y="217884"/>
-            <a:ext cx="914400" cy="5759884"/>
+            <a:off x="8077200" y="267675"/>
+            <a:ext cx="914400" cy="6726850"/>
           </a:xfrm>
           <a:prstGeom prst="roundRect">
             <a:avLst>
@@ -3977,8 +3977,8 @@
         </p:nvSpPr>
         <p:spPr>
           <a:xfrm>
-            <a:off x="8534400" y="-74946"/>
-            <a:ext cx="609600" cy="6273340"/>
+            <a:off x="8534400" y="-258022"/>
+            <a:ext cx="609600" cy="8084679"/>
           </a:xfrm>
           <a:prstGeom prst="rect">
             <a:avLst/>
@@ -4018,51 +4018,142 @@
           </a:p>
         </p:txBody>
       </p:sp>
-      <p:cxnSp>
-        <p:nvCxnSpPr>
-          <p:cNvPr id="14" name="Straight Arrow Connector 13"/>
-          <p:cNvCxnSpPr>
-            <a:stCxn id="12" idx="2"/>
-            <a:endCxn id="16" idx="0"/>
-          </p:cNvCxnSpPr>
+      <p:grpSp>
+        <p:nvGrpSpPr>
+          <p:cNvPr id="18" name="Group 17"/>
+          <p:cNvGrpSpPr/>
           <p:nvPr userDrawn="1"/>
-        </p:nvCxnSpPr>
-        <p:spPr>
-          <a:xfrm flipH="1">
-            <a:off x="4471327" y="3531395"/>
-            <a:ext cx="2" cy="379702"/>
-          </a:xfrm>
-          <a:prstGeom prst="straightConnector1">
-            <a:avLst/>
-          </a:prstGeom>
-          <a:ln>
-            <a:solidFill>
-              <a:schemeClr val="accent4">
-                <a:lumMod val="75000"/>
+        </p:nvGrpSpPr>
+        <p:grpSpPr>
+          <a:xfrm>
+            <a:off x="1250577" y="5765155"/>
+            <a:ext cx="6440373" cy="991453"/>
+            <a:chOff x="-613964" y="1176232"/>
+            <a:chExt cx="1755532" cy="1915533"/>
+          </a:xfrm>
+          <a:solidFill>
+            <a:schemeClr val="bg1"/>
+          </a:solidFill>
+        </p:grpSpPr>
+        <p:sp>
+          <p:nvSpPr>
+            <p:cNvPr id="19" name="Rectangle 18"/>
+            <p:cNvSpPr/>
+            <p:nvPr/>
+          </p:nvSpPr>
+          <p:spPr>
+            <a:xfrm>
+              <a:off x="-613964" y="1524000"/>
+              <a:ext cx="1752686" cy="1567765"/>
+            </a:xfrm>
+            <a:prstGeom prst="rect">
+              <a:avLst/>
+            </a:prstGeom>
+            <a:grpFill/>
+            <a:ln>
+              <a:solidFill>
+                <a:schemeClr val="accent4">
+                  <a:lumMod val="75000"/>
+                </a:schemeClr>
+              </a:solidFill>
+            </a:ln>
+          </p:spPr>
+          <p:style>
+            <a:lnRef idx="2">
+              <a:schemeClr val="accent1">
+                <a:shade val="50000"/>
               </a:schemeClr>
-            </a:solidFill>
-            <a:prstDash val="sysDot"/>
-            <a:headEnd type="arrow" w="med" len="med"/>
-            <a:tailEnd type="none" w="med" len="med"/>
-          </a:ln>
-        </p:spPr>
-        <p:style>
-          <a:lnRef idx="2">
-            <a:schemeClr val="accent2">
-              <a:shade val="50000"/>
-            </a:schemeClr>
-          </a:lnRef>
-          <a:fillRef idx="1">
-            <a:schemeClr val="accent2"/>
-          </a:fillRef>
-          <a:effectRef idx="0">
-            <a:schemeClr val="accent2"/>
-          </a:effectRef>
-          <a:fontRef idx="minor">
-            <a:schemeClr val="lt1"/>
-          </a:fontRef>
-        </p:style>
-      </p:cxnSp>
+            </a:lnRef>
+            <a:fillRef idx="1">
+              <a:schemeClr val="accent1"/>
+            </a:fillRef>
+            <a:effectRef idx="0">
+              <a:schemeClr val="accent1"/>
+            </a:effectRef>
+            <a:fontRef idx="minor">
+              <a:schemeClr val="lt1"/>
+            </a:fontRef>
+          </p:style>
+          <p:txBody>
+            <a:bodyPr rtlCol="0" anchor="t" anchorCtr="0"/>
+            <a:lstStyle/>
+            <a:p>
+              <a:pPr algn="l"/>
+              <a:r>
+                <a:rPr lang="en-US" sz="1400" b="1" dirty="0" smtClean="0">
+                  <a:solidFill>
+                    <a:schemeClr val="accent4">
+                      <a:lumMod val="75000"/>
+                    </a:schemeClr>
+                  </a:solidFill>
+                </a:rPr>
+                <a:t>logic::backdoor</a:t>
+              </a:r>
+              <a:endParaRPr lang="en-SG" sz="1400" b="1" dirty="0">
+                <a:solidFill>
+                  <a:schemeClr val="accent4">
+                    <a:lumMod val="75000"/>
+                  </a:schemeClr>
+                </a:solidFill>
+              </a:endParaRPr>
+            </a:p>
+          </p:txBody>
+        </p:sp>
+        <p:sp>
+          <p:nvSpPr>
+            <p:cNvPr id="20" name="Rectangle 19"/>
+            <p:cNvSpPr/>
+            <p:nvPr/>
+          </p:nvSpPr>
+          <p:spPr>
+            <a:xfrm>
+              <a:off x="749049" y="1176232"/>
+              <a:ext cx="392519" cy="347768"/>
+            </a:xfrm>
+            <a:prstGeom prst="rect">
+              <a:avLst/>
+            </a:prstGeom>
+            <a:grpFill/>
+            <a:ln>
+              <a:solidFill>
+                <a:schemeClr val="accent4">
+                  <a:lumMod val="75000"/>
+                </a:schemeClr>
+              </a:solidFill>
+            </a:ln>
+          </p:spPr>
+          <p:style>
+            <a:lnRef idx="2">
+              <a:schemeClr val="accent1">
+                <a:shade val="50000"/>
+              </a:schemeClr>
+            </a:lnRef>
+            <a:fillRef idx="1">
+              <a:schemeClr val="accent1"/>
+            </a:fillRef>
+            <a:effectRef idx="0">
+              <a:schemeClr val="accent1"/>
+            </a:effectRef>
+            <a:fontRef idx="minor">
+              <a:schemeClr val="lt1"/>
+            </a:fontRef>
+          </p:style>
+          <p:txBody>
+            <a:bodyPr rtlCol="0" anchor="t" anchorCtr="0"/>
+            <a:lstStyle/>
+            <a:p>
+              <a:pPr algn="ctr"/>
+              <a:endParaRPr lang="en-SG" sz="1400" b="1">
+                <a:solidFill>
+                  <a:schemeClr val="accent4">
+                    <a:lumMod val="75000"/>
+                  </a:schemeClr>
+                </a:solidFill>
+              </a:endParaRPr>
+            </a:p>
+          </p:txBody>
+        </p:sp>
+      </p:grpSp>
     </p:spTree>
   </p:cSld>
   <p:clrMap bg1="lt1" tx1="dk1" bg2="lt2" tx2="dk2" accent1="accent1" accent2="accent2" accent3="accent3" accent4="accent4" accent5="accent5" accent6="accent6" hlink="hlink" folHlink="folHlink"/>
@@ -4112,7 +4203,7 @@
           <a:cs typeface="+mn-cs"/>
         </a:defRPr>
       </a:lvl1pPr>
-      <a:lvl2pPr marL="742949" indent="-285750" algn="l" defTabSz="914400" rtl="0" eaLnBrk="1" latinLnBrk="0" hangingPunct="1">
+      <a:lvl2pPr marL="742950" indent="-285750" algn="l" defTabSz="914400" rtl="0" eaLnBrk="1" latinLnBrk="0" hangingPunct="1">
         <a:spcBef>
           <a:spcPct val="20000"/>
         </a:spcBef>
@@ -4127,7 +4218,7 @@
           <a:cs typeface="+mn-cs"/>
         </a:defRPr>
       </a:lvl2pPr>
-      <a:lvl3pPr marL="1142999" indent="-228599" algn="l" defTabSz="914400" rtl="0" eaLnBrk="1" latinLnBrk="0" hangingPunct="1">
+      <a:lvl3pPr marL="1143000" indent="-228600" algn="l" defTabSz="914400" rtl="0" eaLnBrk="1" latinLnBrk="0" hangingPunct="1">
         <a:spcBef>
           <a:spcPct val="20000"/>
         </a:spcBef>
@@ -4142,7 +4233,7 @@
           <a:cs typeface="+mn-cs"/>
         </a:defRPr>
       </a:lvl3pPr>
-      <a:lvl4pPr marL="1600199" indent="-228599" algn="l" defTabSz="914400" rtl="0" eaLnBrk="1" latinLnBrk="0" hangingPunct="1">
+      <a:lvl4pPr marL="1600200" indent="-228600" algn="l" defTabSz="914400" rtl="0" eaLnBrk="1" latinLnBrk="0" hangingPunct="1">
         <a:spcBef>
           <a:spcPct val="20000"/>
         </a:spcBef>
@@ -4157,7 +4248,7 @@
           <a:cs typeface="+mn-cs"/>
         </a:defRPr>
       </a:lvl4pPr>
-      <a:lvl5pPr marL="2057398" indent="-228599" algn="l" defTabSz="914400" rtl="0" eaLnBrk="1" latinLnBrk="0" hangingPunct="1">
+      <a:lvl5pPr marL="2057400" indent="-228600" algn="l" defTabSz="914400" rtl="0" eaLnBrk="1" latinLnBrk="0" hangingPunct="1">
         <a:spcBef>
           <a:spcPct val="20000"/>
         </a:spcBef>
@@ -4172,7 +4263,7 @@
           <a:cs typeface="+mn-cs"/>
         </a:defRPr>
       </a:lvl5pPr>
-      <a:lvl6pPr marL="2514597" indent="-228599" algn="l" defTabSz="914400" rtl="0" eaLnBrk="1" latinLnBrk="0" hangingPunct="1">
+      <a:lvl6pPr marL="2514600" indent="-228600" algn="l" defTabSz="914400" rtl="0" eaLnBrk="1" latinLnBrk="0" hangingPunct="1">
         <a:spcBef>
           <a:spcPct val="20000"/>
         </a:spcBef>
@@ -4187,7 +4278,7 @@
           <a:cs typeface="+mn-cs"/>
         </a:defRPr>
       </a:lvl6pPr>
-      <a:lvl7pPr marL="2971797" indent="-228599" algn="l" defTabSz="914400" rtl="0" eaLnBrk="1" latinLnBrk="0" hangingPunct="1">
+      <a:lvl7pPr marL="2971800" indent="-228600" algn="l" defTabSz="914400" rtl="0" eaLnBrk="1" latinLnBrk="0" hangingPunct="1">
         <a:spcBef>
           <a:spcPct val="20000"/>
         </a:spcBef>
@@ -4202,7 +4293,7 @@
           <a:cs typeface="+mn-cs"/>
         </a:defRPr>
       </a:lvl7pPr>
-      <a:lvl8pPr marL="3428997" indent="-228599" algn="l" defTabSz="914400" rtl="0" eaLnBrk="1" latinLnBrk="0" hangingPunct="1">
+      <a:lvl8pPr marL="3429000" indent="-228600" algn="l" defTabSz="914400" rtl="0" eaLnBrk="1" latinLnBrk="0" hangingPunct="1">
         <a:spcBef>
           <a:spcPct val="20000"/>
         </a:spcBef>
@@ -4217,7 +4308,7 @@
           <a:cs typeface="+mn-cs"/>
         </a:defRPr>
       </a:lvl8pPr>
-      <a:lvl9pPr marL="3886196" indent="-228599" algn="l" defTabSz="914400" rtl="0" eaLnBrk="1" latinLnBrk="0" hangingPunct="1">
+      <a:lvl9pPr marL="3886200" indent="-228600" algn="l" defTabSz="914400" rtl="0" eaLnBrk="1" latinLnBrk="0" hangingPunct="1">
         <a:spcBef>
           <a:spcPct val="20000"/>
         </a:spcBef>
@@ -4267,7 +4358,7 @@
           <a:cs typeface="+mn-cs"/>
         </a:defRPr>
       </a:lvl3pPr>
-      <a:lvl4pPr marL="1371598" algn="l" defTabSz="914400" rtl="0" eaLnBrk="1" latinLnBrk="0" hangingPunct="1">
+      <a:lvl4pPr marL="1371600" algn="l" defTabSz="914400" rtl="0" eaLnBrk="1" latinLnBrk="0" hangingPunct="1">
         <a:defRPr sz="1800" kern="1200">
           <a:solidFill>
             <a:schemeClr val="tx1"/>
@@ -4277,7 +4368,7 @@
           <a:cs typeface="+mn-cs"/>
         </a:defRPr>
       </a:lvl4pPr>
-      <a:lvl5pPr marL="1828798" algn="l" defTabSz="914400" rtl="0" eaLnBrk="1" latinLnBrk="0" hangingPunct="1">
+      <a:lvl5pPr marL="1828800" algn="l" defTabSz="914400" rtl="0" eaLnBrk="1" latinLnBrk="0" hangingPunct="1">
         <a:defRPr sz="1800" kern="1200">
           <a:solidFill>
             <a:schemeClr val="tx1"/>
@@ -4287,7 +4378,7 @@
           <a:cs typeface="+mn-cs"/>
         </a:defRPr>
       </a:lvl5pPr>
-      <a:lvl6pPr marL="2285998" algn="l" defTabSz="914400" rtl="0" eaLnBrk="1" latinLnBrk="0" hangingPunct="1">
+      <a:lvl6pPr marL="2286000" algn="l" defTabSz="914400" rtl="0" eaLnBrk="1" latinLnBrk="0" hangingPunct="1">
         <a:defRPr sz="1800" kern="1200">
           <a:solidFill>
             <a:schemeClr val="tx1"/>
@@ -4297,7 +4388,7 @@
           <a:cs typeface="+mn-cs"/>
         </a:defRPr>
       </a:lvl6pPr>
-      <a:lvl7pPr marL="2743198" algn="l" defTabSz="914400" rtl="0" eaLnBrk="1" latinLnBrk="0" hangingPunct="1">
+      <a:lvl7pPr marL="2743200" algn="l" defTabSz="914400" rtl="0" eaLnBrk="1" latinLnBrk="0" hangingPunct="1">
         <a:defRPr sz="1800" kern="1200">
           <a:solidFill>
             <a:schemeClr val="tx1"/>
@@ -4307,7 +4398,7 @@
           <a:cs typeface="+mn-cs"/>
         </a:defRPr>
       </a:lvl7pPr>
-      <a:lvl8pPr marL="3200397" algn="l" defTabSz="914400" rtl="0" eaLnBrk="1" latinLnBrk="0" hangingPunct="1">
+      <a:lvl8pPr marL="3200400" algn="l" defTabSz="914400" rtl="0" eaLnBrk="1" latinLnBrk="0" hangingPunct="1">
         <a:defRPr sz="1800" kern="1200">
           <a:solidFill>
             <a:schemeClr val="tx1"/>
@@ -4317,7 +4408,7 @@
           <a:cs typeface="+mn-cs"/>
         </a:defRPr>
       </a:lvl8pPr>
-      <a:lvl9pPr marL="3657596" algn="l" defTabSz="914400" rtl="0" eaLnBrk="1" latinLnBrk="0" hangingPunct="1">
+      <a:lvl9pPr marL="3657600" algn="l" defTabSz="914400" rtl="0" eaLnBrk="1" latinLnBrk="0" hangingPunct="1">
         <a:defRPr sz="1800" kern="1200">
           <a:solidFill>
             <a:schemeClr val="tx1"/>
@@ -4351,13 +4442,13 @@
       </p:grpSpPr>
       <p:sp>
         <p:nvSpPr>
-          <p:cNvPr id="135" name="Rectangle 134"/>
+          <p:cNvPr id="49" name="Rectangle 48"/>
           <p:cNvSpPr/>
           <p:nvPr/>
         </p:nvSpPr>
         <p:spPr>
           <a:xfrm>
-            <a:off x="3686909" y="4598735"/>
+            <a:off x="3686908" y="4708754"/>
             <a:ext cx="1676400" cy="396000"/>
           </a:xfrm>
           <a:prstGeom prst="rect">
@@ -4395,14 +4486,183 @@
       </p:sp>
       <p:sp>
         <p:nvSpPr>
-          <p:cNvPr id="136" name="TextBox 135"/>
+          <p:cNvPr id="51" name="Rectangle 50"/>
+          <p:cNvSpPr/>
+          <p:nvPr/>
+        </p:nvSpPr>
+        <p:spPr>
+          <a:xfrm>
+            <a:off x="5678032" y="6287889"/>
+            <a:ext cx="1872000" cy="360000"/>
+          </a:xfrm>
+          <a:prstGeom prst="rect">
+            <a:avLst/>
+          </a:prstGeom>
+        </p:spPr>
+        <p:style>
+          <a:lnRef idx="2">
+            <a:schemeClr val="accent3">
+              <a:shade val="50000"/>
+            </a:schemeClr>
+          </a:lnRef>
+          <a:fillRef idx="1">
+            <a:schemeClr val="accent3"/>
+          </a:fillRef>
+          <a:effectRef idx="0">
+            <a:schemeClr val="accent3"/>
+          </a:effectRef>
+          <a:fontRef idx="minor">
+            <a:schemeClr val="lt1"/>
+          </a:fontRef>
+        </p:style>
+        <p:txBody>
+          <a:bodyPr rtlCol="0" anchor="ctr"/>
+          <a:lstStyle/>
+          <a:p>
+            <a:pPr algn="ctr"/>
+            <a:r>
+              <a:rPr lang="en-US" sz="1600" b="1" dirty="0" err="1" smtClean="0"/>
+              <a:t>BackDoorLogic</a:t>
+            </a:r>
+            <a:endParaRPr lang="en-SG" sz="1600" b="1" dirty="0"/>
+          </a:p>
+        </p:txBody>
+      </p:sp>
+      <p:sp>
+        <p:nvSpPr>
+          <p:cNvPr id="52" name="Rectangle 51"/>
+          <p:cNvSpPr/>
+          <p:nvPr/>
+        </p:nvSpPr>
+        <p:spPr>
+          <a:xfrm>
+            <a:off x="3538200" y="6287889"/>
+            <a:ext cx="1872000" cy="360000"/>
+          </a:xfrm>
+          <a:prstGeom prst="rect">
+            <a:avLst/>
+          </a:prstGeom>
+        </p:spPr>
+        <p:style>
+          <a:lnRef idx="2">
+            <a:schemeClr val="accent3">
+              <a:shade val="50000"/>
+            </a:schemeClr>
+          </a:lnRef>
+          <a:fillRef idx="1">
+            <a:schemeClr val="accent3"/>
+          </a:fillRef>
+          <a:effectRef idx="0">
+            <a:schemeClr val="accent3"/>
+          </a:effectRef>
+          <a:fontRef idx="minor">
+            <a:schemeClr val="lt1"/>
+          </a:fontRef>
+        </p:style>
+        <p:txBody>
+          <a:bodyPr rtlCol="0" anchor="ctr"/>
+          <a:lstStyle/>
+          <a:p>
+            <a:pPr algn="ctr"/>
+            <a:r>
+              <a:rPr lang="en-US" sz="1600" b="1" dirty="0" err="1"/>
+              <a:t>BackDoorServlet</a:t>
+            </a:r>
+            <a:endParaRPr lang="en-SG" sz="1600" b="1" dirty="0"/>
+          </a:p>
+        </p:txBody>
+      </p:sp>
+      <p:sp>
+        <p:nvSpPr>
+          <p:cNvPr id="53" name="Isosceles Triangle 52"/>
+          <p:cNvSpPr/>
+          <p:nvPr/>
+        </p:nvSpPr>
+        <p:spPr>
+          <a:xfrm>
+            <a:off x="4366200" y="5110149"/>
+            <a:ext cx="216000" cy="216000"/>
+          </a:xfrm>
+          <a:prstGeom prst="triangle">
+            <a:avLst/>
+          </a:prstGeom>
+        </p:spPr>
+        <p:style>
+          <a:lnRef idx="2">
+            <a:schemeClr val="accent2">
+              <a:shade val="50000"/>
+            </a:schemeClr>
+          </a:lnRef>
+          <a:fillRef idx="1">
+            <a:schemeClr val="accent2"/>
+          </a:fillRef>
+          <a:effectRef idx="0">
+            <a:schemeClr val="accent2"/>
+          </a:effectRef>
+          <a:fontRef idx="minor">
+            <a:schemeClr val="lt1"/>
+          </a:fontRef>
+        </p:style>
+        <p:txBody>
+          <a:bodyPr rtlCol="0" anchor="ctr"/>
+          <a:lstStyle/>
+          <a:p>
+            <a:pPr algn="ctr"/>
+            <a:endParaRPr lang="en-SG"/>
+          </a:p>
+        </p:txBody>
+      </p:sp>
+      <p:cxnSp>
+        <p:nvCxnSpPr>
+          <p:cNvPr id="54" name="Elbow Connector 53"/>
+          <p:cNvCxnSpPr>
+            <a:stCxn id="53" idx="3"/>
+            <a:endCxn id="51" idx="0"/>
+          </p:cNvCxnSpPr>
+          <p:nvPr/>
+        </p:nvCxnSpPr>
+        <p:spPr>
+          <a:xfrm rot="16200000" flipH="1">
+            <a:off x="5063246" y="4737103"/>
+            <a:ext cx="961740" cy="2139832"/>
+          </a:xfrm>
+          <a:prstGeom prst="bentConnector3">
+            <a:avLst>
+              <a:gd name="adj1" fmla="val 80618"/>
+            </a:avLst>
+          </a:prstGeom>
+          <a:ln w="28575">
+            <a:headEnd type="none" w="med" len="med"/>
+            <a:tailEnd type="none" w="med" len="med"/>
+          </a:ln>
+        </p:spPr>
+        <p:style>
+          <a:lnRef idx="2">
+            <a:schemeClr val="accent2">
+              <a:shade val="50000"/>
+            </a:schemeClr>
+          </a:lnRef>
+          <a:fillRef idx="1">
+            <a:schemeClr val="accent2"/>
+          </a:fillRef>
+          <a:effectRef idx="0">
+            <a:schemeClr val="accent2"/>
+          </a:effectRef>
+          <a:fontRef idx="minor">
+            <a:schemeClr val="lt1"/>
+          </a:fontRef>
+        </p:style>
+      </p:cxnSp>
+      <p:sp>
+        <p:nvSpPr>
+          <p:cNvPr id="62" name="TextBox 61"/>
           <p:cNvSpPr txBox="1"/>
           <p:nvPr/>
         </p:nvSpPr>
         <p:spPr>
           <a:xfrm>
-            <a:off x="381000" y="4250951"/>
-            <a:ext cx="609600" cy="426719"/>
+            <a:off x="248659" y="4360969"/>
+            <a:ext cx="609600" cy="426720"/>
           </a:xfrm>
           <a:prstGeom prst="rect">
             <a:avLst/>
@@ -4499,8 +4759,9 @@
             </a:lvl9pPr>
           </a:lstStyle>
           <a:p>
-            <a:r>
-              <a:rPr lang="en-US" sz="1600" dirty="0" smtClean="0">
+            <a:pPr algn="r"/>
+            <a:r>
+              <a:rPr lang="en-US" sz="1600" dirty="0">
                 <a:solidFill>
                   <a:schemeClr val="tx1"/>
                 </a:solidFill>
@@ -4517,13 +4778,13 @@
       </p:sp>
       <p:sp>
         <p:nvSpPr>
-          <p:cNvPr id="137" name="Rectangle 136"/>
+          <p:cNvPr id="68" name="Rectangle 67"/>
           <p:cNvSpPr/>
           <p:nvPr/>
         </p:nvSpPr>
         <p:spPr>
           <a:xfrm>
-            <a:off x="5071200" y="1483716"/>
+            <a:off x="5071200" y="1650610"/>
             <a:ext cx="2304000" cy="274320"/>
           </a:xfrm>
           <a:prstGeom prst="rect">
@@ -4561,13 +4822,13 @@
       </p:sp>
       <p:sp>
         <p:nvSpPr>
-          <p:cNvPr id="138" name="Rectangle 137"/>
+          <p:cNvPr id="69" name="Rectangle 68"/>
           <p:cNvSpPr/>
           <p:nvPr/>
         </p:nvSpPr>
         <p:spPr>
           <a:xfrm>
-            <a:off x="5071200" y="1873147"/>
+            <a:off x="5071200" y="2040041"/>
             <a:ext cx="2304000" cy="274320"/>
           </a:xfrm>
           <a:prstGeom prst="rect">
@@ -4605,13 +4866,13 @@
       </p:sp>
       <p:sp>
         <p:nvSpPr>
-          <p:cNvPr id="139" name="Rectangle 138"/>
+          <p:cNvPr id="70" name="Rectangle 69"/>
           <p:cNvSpPr/>
           <p:nvPr/>
         </p:nvSpPr>
         <p:spPr>
           <a:xfrm>
-            <a:off x="5071200" y="2657628"/>
+            <a:off x="5071200" y="2824522"/>
             <a:ext cx="2304000" cy="274320"/>
           </a:xfrm>
           <a:prstGeom prst="rect">
@@ -4649,15 +4910,15 @@
       </p:sp>
       <p:cxnSp>
         <p:nvCxnSpPr>
-          <p:cNvPr id="140" name="Straight Arrow Connector 139"/>
+          <p:cNvPr id="71" name="Straight Arrow Connector 70"/>
           <p:cNvCxnSpPr>
-            <a:stCxn id="138" idx="3"/>
+            <a:stCxn id="69" idx="3"/>
           </p:cNvCxnSpPr>
           <p:nvPr/>
         </p:nvCxnSpPr>
         <p:spPr>
           <a:xfrm>
-            <a:off x="7375200" y="2010306"/>
+            <a:off x="7375200" y="2177201"/>
             <a:ext cx="666000" cy="0"/>
           </a:xfrm>
           <a:prstGeom prst="straightConnector1">
@@ -4690,15 +4951,15 @@
       </p:cxnSp>
       <p:cxnSp>
         <p:nvCxnSpPr>
-          <p:cNvPr id="141" name="Straight Arrow Connector 140"/>
+          <p:cNvPr id="72" name="Straight Arrow Connector 71"/>
           <p:cNvCxnSpPr>
-            <a:stCxn id="137" idx="3"/>
+            <a:stCxn id="68" idx="3"/>
           </p:cNvCxnSpPr>
           <p:nvPr/>
         </p:nvCxnSpPr>
         <p:spPr>
           <a:xfrm>
-            <a:off x="7375200" y="1620876"/>
+            <a:off x="7375200" y="1787770"/>
             <a:ext cx="666000" cy="0"/>
           </a:xfrm>
           <a:prstGeom prst="straightConnector1">
@@ -4731,13 +4992,13 @@
       </p:cxnSp>
       <p:sp>
         <p:nvSpPr>
-          <p:cNvPr id="142" name="Rectangle 141"/>
+          <p:cNvPr id="74" name="Rectangle 73"/>
           <p:cNvSpPr/>
           <p:nvPr/>
         </p:nvSpPr>
         <p:spPr>
           <a:xfrm>
-            <a:off x="5071200" y="1092994"/>
+            <a:off x="5071200" y="1259889"/>
             <a:ext cx="2304000" cy="274320"/>
           </a:xfrm>
           <a:prstGeom prst="rect">
@@ -4775,13 +5036,13 @@
       </p:sp>
       <p:sp>
         <p:nvSpPr>
-          <p:cNvPr id="143" name="Rectangle 142"/>
+          <p:cNvPr id="75" name="Rectangle 74"/>
           <p:cNvSpPr/>
           <p:nvPr/>
         </p:nvSpPr>
         <p:spPr>
           <a:xfrm>
-            <a:off x="5071200" y="2266403"/>
+            <a:off x="5071200" y="2433297"/>
             <a:ext cx="2304000" cy="274320"/>
           </a:xfrm>
           <a:prstGeom prst="rect">
@@ -4819,15 +5080,15 @@
       </p:sp>
       <p:cxnSp>
         <p:nvCxnSpPr>
-          <p:cNvPr id="144" name="Straight Arrow Connector 143"/>
+          <p:cNvPr id="76" name="Straight Arrow Connector 75"/>
           <p:cNvCxnSpPr>
-            <a:stCxn id="142" idx="3"/>
+            <a:stCxn id="74" idx="3"/>
           </p:cNvCxnSpPr>
           <p:nvPr/>
         </p:nvCxnSpPr>
         <p:spPr>
           <a:xfrm>
-            <a:off x="7375200" y="1230154"/>
+            <a:off x="7375200" y="1397049"/>
             <a:ext cx="666000" cy="0"/>
           </a:xfrm>
           <a:prstGeom prst="straightConnector1">
@@ -4860,15 +5121,15 @@
       </p:cxnSp>
       <p:cxnSp>
         <p:nvCxnSpPr>
-          <p:cNvPr id="145" name="Straight Arrow Connector 144"/>
+          <p:cNvPr id="77" name="Straight Arrow Connector 76"/>
           <p:cNvCxnSpPr>
-            <a:stCxn id="143" idx="3"/>
+            <a:stCxn id="75" idx="3"/>
           </p:cNvCxnSpPr>
           <p:nvPr/>
         </p:nvCxnSpPr>
         <p:spPr>
           <a:xfrm>
-            <a:off x="7375200" y="2403563"/>
+            <a:off x="7375200" y="2570457"/>
             <a:ext cx="666000" cy="0"/>
           </a:xfrm>
           <a:prstGeom prst="straightConnector1">
@@ -4901,15 +5162,15 @@
       </p:cxnSp>
       <p:cxnSp>
         <p:nvCxnSpPr>
-          <p:cNvPr id="151" name="Straight Arrow Connector 150"/>
+          <p:cNvPr id="78" name="Straight Arrow Connector 77"/>
           <p:cNvCxnSpPr>
-            <a:stCxn id="139" idx="3"/>
+            <a:stCxn id="70" idx="3"/>
           </p:cNvCxnSpPr>
           <p:nvPr/>
         </p:nvCxnSpPr>
         <p:spPr>
           <a:xfrm>
-            <a:off x="7375200" y="2794788"/>
+            <a:off x="7375200" y="2961682"/>
             <a:ext cx="666000" cy="0"/>
           </a:xfrm>
           <a:prstGeom prst="straightConnector1">
@@ -4942,13 +5203,13 @@
       </p:cxnSp>
       <p:sp>
         <p:nvSpPr>
-          <p:cNvPr id="152" name="Rectangle 151"/>
+          <p:cNvPr id="82" name="Rectangle 81"/>
           <p:cNvSpPr/>
           <p:nvPr/>
         </p:nvSpPr>
         <p:spPr>
           <a:xfrm>
-            <a:off x="5071200" y="3047798"/>
+            <a:off x="5071200" y="3214693"/>
             <a:ext cx="2304000" cy="274320"/>
           </a:xfrm>
           <a:prstGeom prst="rect">
@@ -4986,15 +5247,15 @@
       </p:sp>
       <p:cxnSp>
         <p:nvCxnSpPr>
-          <p:cNvPr id="153" name="Straight Arrow Connector 152"/>
+          <p:cNvPr id="83" name="Straight Arrow Connector 82"/>
           <p:cNvCxnSpPr>
-            <a:stCxn id="152" idx="3"/>
+            <a:stCxn id="82" idx="3"/>
           </p:cNvCxnSpPr>
           <p:nvPr/>
         </p:nvCxnSpPr>
         <p:spPr>
           <a:xfrm>
-            <a:off x="7375200" y="3184958"/>
+            <a:off x="7375200" y="3351853"/>
             <a:ext cx="666000" cy="0"/>
           </a:xfrm>
           <a:prstGeom prst="straightConnector1">
@@ -5005,6 +5266,87 @@
               <a:schemeClr val="accent4">
                 <a:lumMod val="75000"/>
               </a:schemeClr>
+            </a:solidFill>
+            <a:prstDash val="sysDash"/>
+            <a:tailEnd type="arrow"/>
+          </a:ln>
+        </p:spPr>
+        <p:style>
+          <a:lnRef idx="1">
+            <a:schemeClr val="accent1"/>
+          </a:lnRef>
+          <a:fillRef idx="0">
+            <a:schemeClr val="accent1"/>
+          </a:fillRef>
+          <a:effectRef idx="0">
+            <a:schemeClr val="accent1"/>
+          </a:effectRef>
+          <a:fontRef idx="minor">
+            <a:schemeClr val="tx1"/>
+          </a:fontRef>
+        </p:style>
+      </p:cxnSp>
+      <p:sp>
+        <p:nvSpPr>
+          <p:cNvPr id="112" name="Rectangle 111"/>
+          <p:cNvSpPr/>
+          <p:nvPr/>
+        </p:nvSpPr>
+        <p:spPr>
+          <a:xfrm>
+            <a:off x="1379192" y="6287889"/>
+            <a:ext cx="1872000" cy="360000"/>
+          </a:xfrm>
+          <a:prstGeom prst="rect">
+            <a:avLst/>
+          </a:prstGeom>
+        </p:spPr>
+        <p:style>
+          <a:lnRef idx="2">
+            <a:schemeClr val="accent3">
+              <a:shade val="50000"/>
+            </a:schemeClr>
+          </a:lnRef>
+          <a:fillRef idx="1">
+            <a:schemeClr val="accent3"/>
+          </a:fillRef>
+          <a:effectRef idx="0">
+            <a:schemeClr val="accent3"/>
+          </a:effectRef>
+          <a:fontRef idx="minor">
+            <a:schemeClr val="lt1"/>
+          </a:fontRef>
+        </p:style>
+        <p:txBody>
+          <a:bodyPr rtlCol="0" anchor="ctr"/>
+          <a:lstStyle/>
+          <a:p>
+            <a:pPr algn="ctr"/>
+            <a:r>
+              <a:rPr lang="en-US" sz="1600" b="1" dirty="0" err="1" smtClean="0"/>
+              <a:t>BackDoorOperation</a:t>
+            </a:r>
+            <a:endParaRPr lang="en-SG" sz="1600" b="1" dirty="0"/>
+          </a:p>
+        </p:txBody>
+      </p:sp>
+      <p:cxnSp>
+        <p:nvCxnSpPr>
+          <p:cNvPr id="114" name="Straight Arrow Connector 113"/>
+          <p:cNvCxnSpPr/>
+          <p:nvPr/>
+        </p:nvCxnSpPr>
+        <p:spPr>
+          <a:xfrm>
+            <a:off x="323761" y="4787689"/>
+            <a:ext cx="900000" cy="0"/>
+          </a:xfrm>
+          <a:prstGeom prst="straightConnector1">
+            <a:avLst/>
+          </a:prstGeom>
+          <a:ln w="38100">
+            <a:solidFill>
+              <a:schemeClr val="tx1"/>
             </a:solidFill>
             <a:prstDash val="sysDash"/>
             <a:tailEnd type="arrow"/>
@@ -5027,55 +5369,33 @@
       </p:cxnSp>
       <p:cxnSp>
         <p:nvCxnSpPr>
-          <p:cNvPr id="154" name="Straight Arrow Connector 153"/>
-          <p:cNvCxnSpPr/>
+          <p:cNvPr id="115" name="Elbow Connector 114"/>
+          <p:cNvCxnSpPr>
+            <a:stCxn id="52" idx="1"/>
+            <a:endCxn id="112" idx="3"/>
+          </p:cNvCxnSpPr>
           <p:nvPr/>
         </p:nvCxnSpPr>
         <p:spPr>
-          <a:xfrm>
-            <a:off x="323761" y="4677670"/>
-            <a:ext cx="900000" cy="0"/>
-          </a:xfrm>
-          <a:prstGeom prst="straightConnector1">
-            <a:avLst/>
-          </a:prstGeom>
-          <a:ln w="38100">
+          <a:xfrm rot="10800000">
+            <a:off x="3251192" y="6480589"/>
+            <a:ext cx="287008" cy="0"/>
+          </a:xfrm>
+          <a:prstGeom prst="bentConnector3">
+            <a:avLst>
+              <a:gd name="adj1" fmla="val 50000"/>
+            </a:avLst>
+          </a:prstGeom>
+          <a:ln w="28575">
             <a:solidFill>
-              <a:schemeClr val="tx1"/>
+              <a:schemeClr val="accent3">
+                <a:lumMod val="75000"/>
+              </a:schemeClr>
             </a:solidFill>
-            <a:prstDash val="sysDash"/>
-            <a:tailEnd type="arrow"/>
+            <a:prstDash val="sysDot"/>
+            <a:headEnd type="none" w="med" len="med"/>
+            <a:tailEnd type="arrow" w="med" len="med"/>
           </a:ln>
-        </p:spPr>
-        <p:style>
-          <a:lnRef idx="1">
-            <a:schemeClr val="accent1"/>
-          </a:lnRef>
-          <a:fillRef idx="0">
-            <a:schemeClr val="accent1"/>
-          </a:fillRef>
-          <a:effectRef idx="0">
-            <a:schemeClr val="accent1"/>
-          </a:effectRef>
-          <a:fontRef idx="minor">
-            <a:schemeClr val="tx1"/>
-          </a:fontRef>
-        </p:style>
-      </p:cxnSp>
-      <p:sp>
-        <p:nvSpPr>
-          <p:cNvPr id="155" name="Rectangle 154"/>
-          <p:cNvSpPr/>
-          <p:nvPr/>
-        </p:nvSpPr>
-        <p:spPr>
-          <a:xfrm>
-            <a:off x="1598727" y="4299072"/>
-            <a:ext cx="1676400" cy="396000"/>
-          </a:xfrm>
-          <a:prstGeom prst="rect">
-            <a:avLst/>
-          </a:prstGeom>
         </p:spPr>
         <p:style>
           <a:lnRef idx="2">
@@ -5093,33 +5413,36 @@
             <a:schemeClr val="lt1"/>
           </a:fontRef>
         </p:style>
-        <p:txBody>
-          <a:bodyPr rtlCol="0" anchor="ctr"/>
-          <a:lstStyle/>
-          <a:p>
-            <a:pPr algn="ctr"/>
-            <a:r>
-              <a:rPr lang="en-US" sz="1600" b="1" dirty="0" err="1"/>
-              <a:t>EmailSender</a:t>
-            </a:r>
-            <a:endParaRPr lang="en-SG" sz="1600" b="1" dirty="0"/>
-          </a:p>
-        </p:txBody>
-      </p:sp>
-      <p:sp>
-        <p:nvSpPr>
-          <p:cNvPr id="161" name="Rectangle 160"/>
-          <p:cNvSpPr/>
+      </p:cxnSp>
+      <p:cxnSp>
+        <p:nvCxnSpPr>
+          <p:cNvPr id="116" name="Elbow Connector 115"/>
+          <p:cNvCxnSpPr>
+            <a:stCxn id="52" idx="3"/>
+            <a:endCxn id="51" idx="1"/>
+          </p:cNvCxnSpPr>
           <p:nvPr/>
-        </p:nvSpPr>
-        <p:spPr>
-          <a:xfrm>
-            <a:off x="1598727" y="4887994"/>
-            <a:ext cx="1676400" cy="396000"/>
-          </a:xfrm>
-          <a:prstGeom prst="rect">
-            <a:avLst/>
-          </a:prstGeom>
+        </p:nvCxnSpPr>
+        <p:spPr>
+          <a:xfrm>
+            <a:off x="5410200" y="6467889"/>
+            <a:ext cx="267832" cy="0"/>
+          </a:xfrm>
+          <a:prstGeom prst="bentConnector3">
+            <a:avLst>
+              <a:gd name="adj1" fmla="val 50000"/>
+            </a:avLst>
+          </a:prstGeom>
+          <a:ln w="28575">
+            <a:solidFill>
+              <a:schemeClr val="accent3">
+                <a:lumMod val="75000"/>
+              </a:schemeClr>
+            </a:solidFill>
+            <a:prstDash val="sysDot"/>
+            <a:headEnd type="none" w="med" len="med"/>
+            <a:tailEnd type="arrow" w="med" len="med"/>
+          </a:ln>
         </p:spPr>
         <p:style>
           <a:lnRef idx="2">
@@ -5137,28 +5460,16 @@
             <a:schemeClr val="lt1"/>
           </a:fontRef>
         </p:style>
-        <p:txBody>
-          <a:bodyPr rtlCol="0" anchor="ctr"/>
-          <a:lstStyle/>
-          <a:p>
-            <a:pPr algn="ctr"/>
-            <a:r>
-              <a:rPr lang="en-US" sz="1600" b="1" dirty="0" err="1"/>
-              <a:t>EmailGenerator</a:t>
-            </a:r>
-            <a:endParaRPr lang="en-SG" sz="1600" b="1" dirty="0"/>
-          </a:p>
-        </p:txBody>
-      </p:sp>
-      <p:sp>
-        <p:nvSpPr>
-          <p:cNvPr id="162" name="Rectangle 161"/>
+      </p:cxnSp>
+      <p:sp>
+        <p:nvSpPr>
+          <p:cNvPr id="117" name="Rectangle 116"/>
           <p:cNvSpPr/>
           <p:nvPr/>
         </p:nvSpPr>
         <p:spPr>
           <a:xfrm>
-            <a:off x="5716800" y="4294371"/>
+            <a:off x="1598728" y="4409090"/>
             <a:ext cx="1676400" cy="396000"/>
           </a:xfrm>
           <a:prstGeom prst="rect">
@@ -5187,8 +5498,8 @@
           <a:p>
             <a:pPr algn="ctr"/>
             <a:r>
-              <a:rPr lang="en-US" sz="1600" b="1" dirty="0" err="1"/>
-              <a:t>TaskQueuer</a:t>
+              <a:rPr lang="en-US" sz="1600" b="1" dirty="0" err="1" smtClean="0"/>
+              <a:t>EmailSender</a:t>
             </a:r>
             <a:endParaRPr lang="en-SG" sz="1600" b="1" dirty="0"/>
           </a:p>
@@ -5196,13 +5507,13 @@
       </p:sp>
       <p:sp>
         <p:nvSpPr>
-          <p:cNvPr id="163" name="Rectangle 162"/>
+          <p:cNvPr id="118" name="Rectangle 117"/>
           <p:cNvSpPr/>
           <p:nvPr/>
         </p:nvSpPr>
         <p:spPr>
           <a:xfrm>
-            <a:off x="5716800" y="4883294"/>
+            <a:off x="1598728" y="4998013"/>
             <a:ext cx="1676400" cy="396000"/>
           </a:xfrm>
           <a:prstGeom prst="rect">
@@ -5231,8 +5542,8 @@
           <a:p>
             <a:pPr algn="ctr"/>
             <a:r>
-              <a:rPr lang="en-US" sz="1600" b="1" dirty="0" err="1"/>
-              <a:t>GateKeeper</a:t>
+              <a:rPr lang="en-US" sz="1600" b="1" dirty="0" err="1" smtClean="0"/>
+              <a:t>EmailGenerator</a:t>
             </a:r>
             <a:endParaRPr lang="en-SG" sz="1600" b="1" dirty="0"/>
           </a:p>
@@ -5240,18 +5551,192 @@
       </p:sp>
       <p:sp>
         <p:nvSpPr>
-          <p:cNvPr id="165" name="Rectangle 164"/>
+          <p:cNvPr id="119" name="Rectangle 118"/>
           <p:cNvSpPr/>
           <p:nvPr/>
         </p:nvSpPr>
         <p:spPr>
           <a:xfrm>
-            <a:off x="1580647" y="1212060"/>
-            <a:ext cx="2304000" cy="274384"/>
-          </a:xfrm>
-          <a:prstGeom prst="rect">
-            <a:avLst/>
-          </a:prstGeom>
+            <a:off x="5716800" y="4404389"/>
+            <a:ext cx="1676400" cy="396000"/>
+          </a:xfrm>
+          <a:prstGeom prst="rect">
+            <a:avLst/>
+          </a:prstGeom>
+        </p:spPr>
+        <p:style>
+          <a:lnRef idx="2">
+            <a:schemeClr val="accent2">
+              <a:shade val="50000"/>
+            </a:schemeClr>
+          </a:lnRef>
+          <a:fillRef idx="1">
+            <a:schemeClr val="accent2"/>
+          </a:fillRef>
+          <a:effectRef idx="0">
+            <a:schemeClr val="accent2"/>
+          </a:effectRef>
+          <a:fontRef idx="minor">
+            <a:schemeClr val="lt1"/>
+          </a:fontRef>
+        </p:style>
+        <p:txBody>
+          <a:bodyPr rtlCol="0" anchor="ctr"/>
+          <a:lstStyle/>
+          <a:p>
+            <a:pPr algn="ctr"/>
+            <a:r>
+              <a:rPr lang="en-US" sz="1600" b="1" dirty="0" err="1" smtClean="0"/>
+              <a:t>TaskQueuer</a:t>
+            </a:r>
+            <a:endParaRPr lang="en-SG" sz="1600" b="1" dirty="0"/>
+          </a:p>
+        </p:txBody>
+      </p:sp>
+      <p:sp>
+        <p:nvSpPr>
+          <p:cNvPr id="120" name="Rectangle 119"/>
+          <p:cNvSpPr/>
+          <p:nvPr/>
+        </p:nvSpPr>
+        <p:spPr>
+          <a:xfrm>
+            <a:off x="5716800" y="4993312"/>
+            <a:ext cx="1676400" cy="396000"/>
+          </a:xfrm>
+          <a:prstGeom prst="rect">
+            <a:avLst/>
+          </a:prstGeom>
+        </p:spPr>
+        <p:style>
+          <a:lnRef idx="2">
+            <a:schemeClr val="accent2">
+              <a:shade val="50000"/>
+            </a:schemeClr>
+          </a:lnRef>
+          <a:fillRef idx="1">
+            <a:schemeClr val="accent2"/>
+          </a:fillRef>
+          <a:effectRef idx="0">
+            <a:schemeClr val="accent2"/>
+          </a:effectRef>
+          <a:fontRef idx="minor">
+            <a:schemeClr val="lt1"/>
+          </a:fontRef>
+        </p:style>
+        <p:txBody>
+          <a:bodyPr rtlCol="0" anchor="ctr"/>
+          <a:lstStyle/>
+          <a:p>
+            <a:pPr algn="ctr"/>
+            <a:r>
+              <a:rPr lang="en-US" sz="1600" b="1" dirty="0" err="1" smtClean="0"/>
+              <a:t>GateKeeper</a:t>
+            </a:r>
+            <a:endParaRPr lang="en-SG" sz="1600" b="1" dirty="0"/>
+          </a:p>
+        </p:txBody>
+      </p:sp>
+      <p:cxnSp>
+        <p:nvCxnSpPr>
+          <p:cNvPr id="121" name="Straight Arrow Connector 120"/>
+          <p:cNvCxnSpPr/>
+          <p:nvPr/>
+        </p:nvCxnSpPr>
+        <p:spPr>
+          <a:xfrm rot="16200000" flipH="1">
+            <a:off x="4296681" y="3812329"/>
+            <a:ext cx="420167" cy="0"/>
+          </a:xfrm>
+          <a:prstGeom prst="straightConnector1">
+            <a:avLst/>
+          </a:prstGeom>
+          <a:ln>
+            <a:solidFill>
+              <a:schemeClr val="accent4">
+                <a:lumMod val="75000"/>
+              </a:schemeClr>
+            </a:solidFill>
+            <a:prstDash val="sysDot"/>
+            <a:headEnd type="arrow" w="med" len="med"/>
+            <a:tailEnd type="none" w="med" len="med"/>
+          </a:ln>
+        </p:spPr>
+        <p:style>
+          <a:lnRef idx="2">
+            <a:schemeClr val="accent2">
+              <a:shade val="50000"/>
+            </a:schemeClr>
+          </a:lnRef>
+          <a:fillRef idx="1">
+            <a:schemeClr val="accent2"/>
+          </a:fillRef>
+          <a:effectRef idx="0">
+            <a:schemeClr val="accent2"/>
+          </a:effectRef>
+          <a:fontRef idx="minor">
+            <a:schemeClr val="lt1"/>
+          </a:fontRef>
+        </p:style>
+      </p:cxnSp>
+      <p:cxnSp>
+        <p:nvCxnSpPr>
+          <p:cNvPr id="122" name="Straight Arrow Connector 121"/>
+          <p:cNvCxnSpPr>
+            <a:stCxn id="123" idx="0"/>
+            <a:endCxn id="51" idx="2"/>
+          </p:cNvCxnSpPr>
+          <p:nvPr/>
+        </p:nvCxnSpPr>
+        <p:spPr>
+          <a:xfrm flipV="1">
+            <a:off x="6614032" y="6647889"/>
+            <a:ext cx="0" cy="529516"/>
+          </a:xfrm>
+          <a:prstGeom prst="straightConnector1">
+            <a:avLst/>
+          </a:prstGeom>
+          <a:ln w="38100">
+            <a:solidFill>
+              <a:schemeClr val="tx1"/>
+            </a:solidFill>
+            <a:prstDash val="sysDash"/>
+            <a:tailEnd type="arrow"/>
+          </a:ln>
+        </p:spPr>
+        <p:style>
+          <a:lnRef idx="1">
+            <a:schemeClr val="accent1"/>
+          </a:lnRef>
+          <a:fillRef idx="0">
+            <a:schemeClr val="accent1"/>
+          </a:fillRef>
+          <a:effectRef idx="0">
+            <a:schemeClr val="accent1"/>
+          </a:effectRef>
+          <a:fontRef idx="minor">
+            <a:schemeClr val="tx1"/>
+          </a:fontRef>
+        </p:style>
+      </p:cxnSp>
+      <p:sp>
+        <p:nvSpPr>
+          <p:cNvPr id="123" name="TextBox 122"/>
+          <p:cNvSpPr txBox="1"/>
+          <p:nvPr/>
+        </p:nvSpPr>
+        <p:spPr>
+          <a:xfrm>
+            <a:off x="5500224" y="7177405"/>
+            <a:ext cx="2227616" cy="426720"/>
+          </a:xfrm>
+          <a:prstGeom prst="rect">
+            <a:avLst/>
+          </a:prstGeom>
+          <a:grpFill/>
+          <a:ln>
+            <a:noFill/>
+          </a:ln>
         </p:spPr>
         <p:style>
           <a:lnRef idx="2">
@@ -5270,32 +5755,111 @@
           </a:fontRef>
         </p:style>
         <p:txBody>
-          <a:bodyPr rtlCol="0" anchor="ctr"/>
-          <a:lstStyle/>
-          <a:p>
-            <a:pPr algn="ctr"/>
-            <a:r>
-              <a:rPr lang="en-US" sz="1600" b="1" dirty="0" err="1"/>
-              <a:t>JavamailService</a:t>
-            </a:r>
-            <a:endParaRPr lang="en-SG" sz="1600" b="1" dirty="0"/>
-          </a:p>
-        </p:txBody>
-      </p:sp>
-      <p:sp>
-        <p:nvSpPr>
-          <p:cNvPr id="166" name="Rectangle 165"/>
-          <p:cNvSpPr/>
+          <a:bodyPr rtlCol="0" anchor="ctr" anchorCtr="0"/>
+          <a:lstStyle>
+            <a:defPPr>
+              <a:defRPr lang="en-US"/>
+            </a:defPPr>
+            <a:lvl1pPr>
+              <a:defRPr sz="1400" b="1">
+                <a:solidFill>
+                  <a:srgbClr val="7030A0"/>
+                </a:solidFill>
+              </a:defRPr>
+            </a:lvl1pPr>
+            <a:lvl2pPr>
+              <a:defRPr>
+                <a:solidFill>
+                  <a:schemeClr val="lt1"/>
+                </a:solidFill>
+              </a:defRPr>
+            </a:lvl2pPr>
+            <a:lvl3pPr>
+              <a:defRPr>
+                <a:solidFill>
+                  <a:schemeClr val="lt1"/>
+                </a:solidFill>
+              </a:defRPr>
+            </a:lvl3pPr>
+            <a:lvl4pPr>
+              <a:defRPr>
+                <a:solidFill>
+                  <a:schemeClr val="lt1"/>
+                </a:solidFill>
+              </a:defRPr>
+            </a:lvl4pPr>
+            <a:lvl5pPr>
+              <a:defRPr>
+                <a:solidFill>
+                  <a:schemeClr val="lt1"/>
+                </a:solidFill>
+              </a:defRPr>
+            </a:lvl5pPr>
+            <a:lvl6pPr>
+              <a:defRPr>
+                <a:solidFill>
+                  <a:schemeClr val="lt1"/>
+                </a:solidFill>
+              </a:defRPr>
+            </a:lvl6pPr>
+            <a:lvl7pPr>
+              <a:defRPr>
+                <a:solidFill>
+                  <a:schemeClr val="lt1"/>
+                </a:solidFill>
+              </a:defRPr>
+            </a:lvl7pPr>
+            <a:lvl8pPr>
+              <a:defRPr>
+                <a:solidFill>
+                  <a:schemeClr val="lt1"/>
+                </a:solidFill>
+              </a:defRPr>
+            </a:lvl8pPr>
+            <a:lvl9pPr>
+              <a:defRPr>
+                <a:solidFill>
+                  <a:schemeClr val="lt1"/>
+                </a:solidFill>
+              </a:defRPr>
+            </a:lvl9pPr>
+          </a:lstStyle>
+          <a:p>
+            <a:pPr algn="r"/>
+            <a:r>
+              <a:rPr lang="en-US" sz="1600" dirty="0">
+                <a:solidFill>
+                  <a:schemeClr val="tx1"/>
+                </a:solidFill>
+              </a:rPr>
+              <a:t>Test driver, Client scripts</a:t>
+            </a:r>
+            <a:endParaRPr lang="en-SG" sz="1600" dirty="0">
+              <a:solidFill>
+                <a:schemeClr val="tx1"/>
+              </a:solidFill>
+            </a:endParaRPr>
+          </a:p>
+        </p:txBody>
+      </p:sp>
+      <p:sp>
+        <p:nvSpPr>
+          <p:cNvPr id="127" name="TextBox 126"/>
+          <p:cNvSpPr txBox="1"/>
           <p:nvPr/>
         </p:nvSpPr>
         <p:spPr>
           <a:xfrm>
-            <a:off x="1580647" y="1602780"/>
-            <a:ext cx="2304000" cy="274384"/>
-          </a:xfrm>
-          <a:prstGeom prst="rect">
-            <a:avLst/>
-          </a:prstGeom>
+            <a:off x="2590800" y="7176404"/>
+            <a:ext cx="1600200" cy="426720"/>
+          </a:xfrm>
+          <a:prstGeom prst="rect">
+            <a:avLst/>
+          </a:prstGeom>
+          <a:grpFill/>
+          <a:ln>
+            <a:noFill/>
+          </a:ln>
         </p:spPr>
         <p:style>
           <a:lnRef idx="2">
@@ -5314,27 +5878,102 @@
           </a:fontRef>
         </p:style>
         <p:txBody>
-          <a:bodyPr rtlCol="0" anchor="ctr"/>
-          <a:lstStyle/>
+          <a:bodyPr rtlCol="0" anchor="ctr" anchorCtr="0"/>
+          <a:lstStyle>
+            <a:defPPr>
+              <a:defRPr lang="en-US"/>
+            </a:defPPr>
+            <a:lvl1pPr>
+              <a:defRPr sz="1400" b="1">
+                <a:solidFill>
+                  <a:srgbClr val="7030A0"/>
+                </a:solidFill>
+              </a:defRPr>
+            </a:lvl1pPr>
+            <a:lvl2pPr>
+              <a:defRPr>
+                <a:solidFill>
+                  <a:schemeClr val="lt1"/>
+                </a:solidFill>
+              </a:defRPr>
+            </a:lvl2pPr>
+            <a:lvl3pPr>
+              <a:defRPr>
+                <a:solidFill>
+                  <a:schemeClr val="lt1"/>
+                </a:solidFill>
+              </a:defRPr>
+            </a:lvl3pPr>
+            <a:lvl4pPr>
+              <a:defRPr>
+                <a:solidFill>
+                  <a:schemeClr val="lt1"/>
+                </a:solidFill>
+              </a:defRPr>
+            </a:lvl4pPr>
+            <a:lvl5pPr>
+              <a:defRPr>
+                <a:solidFill>
+                  <a:schemeClr val="lt1"/>
+                </a:solidFill>
+              </a:defRPr>
+            </a:lvl5pPr>
+            <a:lvl6pPr>
+              <a:defRPr>
+                <a:solidFill>
+                  <a:schemeClr val="lt1"/>
+                </a:solidFill>
+              </a:defRPr>
+            </a:lvl6pPr>
+            <a:lvl7pPr>
+              <a:defRPr>
+                <a:solidFill>
+                  <a:schemeClr val="lt1"/>
+                </a:solidFill>
+              </a:defRPr>
+            </a:lvl7pPr>
+            <a:lvl8pPr>
+              <a:defRPr>
+                <a:solidFill>
+                  <a:schemeClr val="lt1"/>
+                </a:solidFill>
+              </a:defRPr>
+            </a:lvl8pPr>
+            <a:lvl9pPr>
+              <a:defRPr>
+                <a:solidFill>
+                  <a:schemeClr val="lt1"/>
+                </a:solidFill>
+              </a:defRPr>
+            </a:lvl9pPr>
+          </a:lstStyle>
           <a:p>
             <a:pPr algn="ctr"/>
             <a:r>
-              <a:rPr lang="en-US" sz="1600" b="1" dirty="0" err="1"/>
-              <a:t>SendgridService</a:t>
-            </a:r>
-            <a:endParaRPr lang="en-SG" sz="1600" b="1" dirty="0"/>
-          </a:p>
-        </p:txBody>
-      </p:sp>
-      <p:sp>
-        <p:nvSpPr>
-          <p:cNvPr id="167" name="Rectangle 166"/>
+              <a:rPr lang="en-US" sz="1600" dirty="0" smtClean="0">
+                <a:solidFill>
+                  <a:schemeClr val="tx1"/>
+                </a:solidFill>
+              </a:rPr>
+              <a:t>Test driver</a:t>
+            </a:r>
+            <a:endParaRPr lang="en-SG" sz="1600" dirty="0">
+              <a:solidFill>
+                <a:schemeClr val="tx1"/>
+              </a:solidFill>
+            </a:endParaRPr>
+          </a:p>
+        </p:txBody>
+      </p:sp>
+      <p:sp>
+        <p:nvSpPr>
+          <p:cNvPr id="146" name="Rectangle 145"/>
           <p:cNvSpPr/>
           <p:nvPr/>
         </p:nvSpPr>
         <p:spPr>
           <a:xfrm>
-            <a:off x="1580647" y="1980935"/>
+            <a:off x="1580647" y="1378954"/>
             <a:ext cx="2304000" cy="274384"/>
           </a:xfrm>
           <a:prstGeom prst="rect">
@@ -5363,8 +6002,8 @@
           <a:p>
             <a:pPr algn="ctr"/>
             <a:r>
-              <a:rPr lang="en-US" sz="1600" b="1" dirty="0"/>
-              <a:t>*Service</a:t>
+              <a:rPr lang="en-US" sz="1600" b="1" dirty="0" err="1" smtClean="0"/>
+              <a:t>JavamailService</a:t>
             </a:r>
             <a:endParaRPr lang="en-SG" sz="1600" b="1" dirty="0"/>
           </a:p>
@@ -5372,13 +6011,101 @@
       </p:sp>
       <p:sp>
         <p:nvSpPr>
-          <p:cNvPr id="169" name="Rectangle 168"/>
+          <p:cNvPr id="147" name="Rectangle 146"/>
           <p:cNvSpPr/>
           <p:nvPr/>
         </p:nvSpPr>
         <p:spPr>
           <a:xfrm>
-            <a:off x="1580647" y="2849679"/>
+            <a:off x="1580647" y="1769675"/>
+            <a:ext cx="2304000" cy="274384"/>
+          </a:xfrm>
+          <a:prstGeom prst="rect">
+            <a:avLst/>
+          </a:prstGeom>
+        </p:spPr>
+        <p:style>
+          <a:lnRef idx="2">
+            <a:schemeClr val="accent1">
+              <a:shade val="50000"/>
+            </a:schemeClr>
+          </a:lnRef>
+          <a:fillRef idx="1">
+            <a:schemeClr val="accent1"/>
+          </a:fillRef>
+          <a:effectRef idx="0">
+            <a:schemeClr val="accent1"/>
+          </a:effectRef>
+          <a:fontRef idx="minor">
+            <a:schemeClr val="lt1"/>
+          </a:fontRef>
+        </p:style>
+        <p:txBody>
+          <a:bodyPr rtlCol="0" anchor="ctr"/>
+          <a:lstStyle/>
+          <a:p>
+            <a:pPr algn="ctr"/>
+            <a:r>
+              <a:rPr lang="en-US" sz="1600" b="1" dirty="0" err="1" smtClean="0"/>
+              <a:t>SendgridService</a:t>
+            </a:r>
+            <a:endParaRPr lang="en-SG" sz="1600" b="1" dirty="0"/>
+          </a:p>
+        </p:txBody>
+      </p:sp>
+      <p:sp>
+        <p:nvSpPr>
+          <p:cNvPr id="148" name="Rectangle 147"/>
+          <p:cNvSpPr/>
+          <p:nvPr/>
+        </p:nvSpPr>
+        <p:spPr>
+          <a:xfrm>
+            <a:off x="1580647" y="2147829"/>
+            <a:ext cx="2304000" cy="274384"/>
+          </a:xfrm>
+          <a:prstGeom prst="rect">
+            <a:avLst/>
+          </a:prstGeom>
+        </p:spPr>
+        <p:style>
+          <a:lnRef idx="2">
+            <a:schemeClr val="accent1">
+              <a:shade val="50000"/>
+            </a:schemeClr>
+          </a:lnRef>
+          <a:fillRef idx="1">
+            <a:schemeClr val="accent1"/>
+          </a:fillRef>
+          <a:effectRef idx="0">
+            <a:schemeClr val="accent1"/>
+          </a:effectRef>
+          <a:fontRef idx="minor">
+            <a:schemeClr val="lt1"/>
+          </a:fontRef>
+        </p:style>
+        <p:txBody>
+          <a:bodyPr rtlCol="0" anchor="ctr"/>
+          <a:lstStyle/>
+          <a:p>
+            <a:pPr algn="ctr"/>
+            <a:r>
+              <a:rPr lang="en-US" sz="1600" b="1" dirty="0" smtClean="0"/>
+              <a:t>*Service</a:t>
+            </a:r>
+            <a:endParaRPr lang="en-SG" sz="1600" b="1" dirty="0"/>
+          </a:p>
+        </p:txBody>
+      </p:sp>
+      <p:sp>
+        <p:nvSpPr>
+          <p:cNvPr id="149" name="Rectangle 148"/>
+          <p:cNvSpPr/>
+          <p:nvPr/>
+        </p:nvSpPr>
+        <p:spPr>
+          <a:xfrm>
+            <a:off x="1580647" y="3016573"/>
             <a:ext cx="2304000" cy="274320"/>
           </a:xfrm>
           <a:prstGeom prst="rect">
@@ -5407,7 +6134,7 @@
           <a:p>
             <a:pPr algn="ctr"/>
             <a:r>
-              <a:rPr lang="en-US" sz="1600" b="1" dirty="0" err="1"/>
+              <a:rPr lang="en-US" sz="1600" b="1" dirty="0" err="1" smtClean="0"/>
               <a:t>TaskQueuesLogic</a:t>
             </a:r>
             <a:endParaRPr lang="en-SG" sz="1600" b="1" dirty="0"/>
@@ -5416,15 +6143,15 @@
       </p:sp>
       <p:cxnSp>
         <p:nvCxnSpPr>
-          <p:cNvPr id="170" name="Straight Arrow Connector 169"/>
+          <p:cNvPr id="150" name="Straight Arrow Connector 149"/>
           <p:cNvCxnSpPr>
-            <a:stCxn id="169" idx="1"/>
+            <a:stCxn id="149" idx="1"/>
           </p:cNvCxnSpPr>
           <p:nvPr/>
         </p:nvCxnSpPr>
         <p:spPr>
           <a:xfrm flipH="1">
-            <a:off x="858259" y="2986839"/>
+            <a:off x="858259" y="3153733"/>
             <a:ext cx="722388" cy="0"/>
           </a:xfrm>
           <a:prstGeom prst="straightConnector1">
@@ -5457,14 +6184,14 @@
       </p:cxnSp>
       <p:sp>
         <p:nvSpPr>
-          <p:cNvPr id="171" name="TextBox 170"/>
+          <p:cNvPr id="156" name="TextBox 155"/>
           <p:cNvSpPr txBox="1"/>
           <p:nvPr/>
         </p:nvSpPr>
         <p:spPr>
           <a:xfrm>
-            <a:off x="228600" y="2819200"/>
-            <a:ext cx="781800" cy="426719"/>
+            <a:off x="228600" y="2986093"/>
+            <a:ext cx="781800" cy="426720"/>
           </a:xfrm>
           <a:prstGeom prst="rect">
             <a:avLst/>
@@ -5562,7 +6289,7 @@
           </a:lstStyle>
           <a:p>
             <a:r>
-              <a:rPr lang="en-US" sz="1600" dirty="0">
+              <a:rPr lang="en-US" sz="1600" dirty="0" smtClean="0">
                 <a:solidFill>
                   <a:schemeClr val="tx1"/>
                 </a:solidFill>
@@ -5572,7 +6299,7 @@
           </a:p>
           <a:p>
             <a:r>
-              <a:rPr lang="en-US" sz="1600" dirty="0">
+              <a:rPr lang="en-US" sz="1600" dirty="0" smtClean="0">
                 <a:solidFill>
                   <a:schemeClr val="tx1"/>
                 </a:solidFill>
@@ -5582,7 +6309,7 @@
           </a:p>
           <a:p>
             <a:r>
-              <a:rPr lang="en-US" sz="1600" dirty="0">
+              <a:rPr lang="en-US" sz="1600" dirty="0" smtClean="0">
                 <a:solidFill>
                   <a:schemeClr val="tx1"/>
                 </a:solidFill>
@@ -5592,7 +6319,7 @@
           </a:p>
           <a:p>
             <a:r>
-              <a:rPr lang="en-US" sz="1600" dirty="0">
+              <a:rPr lang="en-US" sz="1600" dirty="0" smtClean="0">
                 <a:solidFill>
                   <a:schemeClr val="tx1"/>
                 </a:solidFill>
@@ -5609,14 +6336,14 @@
       </p:sp>
       <p:sp>
         <p:nvSpPr>
-          <p:cNvPr id="172" name="TextBox 171"/>
+          <p:cNvPr id="157" name="TextBox 156"/>
           <p:cNvSpPr txBox="1"/>
           <p:nvPr/>
         </p:nvSpPr>
         <p:spPr>
           <a:xfrm>
-            <a:off x="208800" y="1493631"/>
-            <a:ext cx="781800" cy="426719"/>
+            <a:off x="208800" y="1660525"/>
+            <a:ext cx="781800" cy="426720"/>
           </a:xfrm>
           <a:prstGeom prst="rect">
             <a:avLst/>
@@ -5714,7 +6441,7 @@
           </a:lstStyle>
           <a:p>
             <a:r>
-              <a:rPr lang="en-US" sz="1600" dirty="0">
+              <a:rPr lang="en-US" sz="1600" dirty="0" smtClean="0">
                 <a:solidFill>
                   <a:schemeClr val="tx1"/>
                 </a:solidFill>
@@ -5724,7 +6451,7 @@
           </a:p>
           <a:p>
             <a:r>
-              <a:rPr lang="en-US" sz="1600" dirty="0">
+              <a:rPr lang="en-US" sz="1600" dirty="0" smtClean="0">
                 <a:solidFill>
                   <a:schemeClr val="tx1"/>
                 </a:solidFill>
@@ -5741,15 +6468,15 @@
       </p:sp>
       <p:cxnSp>
         <p:nvCxnSpPr>
-          <p:cNvPr id="173" name="Straight Arrow Connector 172"/>
+          <p:cNvPr id="158" name="Straight Arrow Connector 157"/>
           <p:cNvCxnSpPr>
-            <a:stCxn id="165" idx="1"/>
+            <a:stCxn id="146" idx="1"/>
           </p:cNvCxnSpPr>
           <p:nvPr/>
         </p:nvCxnSpPr>
         <p:spPr>
           <a:xfrm flipH="1">
-            <a:off x="840194" y="1349251"/>
+            <a:off x="840190" y="1516146"/>
             <a:ext cx="740457" cy="0"/>
           </a:xfrm>
           <a:prstGeom prst="straightConnector1">
@@ -5782,15 +6509,15 @@
       </p:cxnSp>
       <p:cxnSp>
         <p:nvCxnSpPr>
-          <p:cNvPr id="174" name="Straight Arrow Connector 173"/>
+          <p:cNvPr id="159" name="Straight Arrow Connector 158"/>
           <p:cNvCxnSpPr>
-            <a:stCxn id="166" idx="1"/>
+            <a:stCxn id="147" idx="1"/>
           </p:cNvCxnSpPr>
           <p:nvPr/>
         </p:nvCxnSpPr>
         <p:spPr>
           <a:xfrm flipH="1">
-            <a:off x="838204" y="1739972"/>
+            <a:off x="838200" y="1906867"/>
             <a:ext cx="742447" cy="0"/>
           </a:xfrm>
           <a:prstGeom prst="straightConnector1">
@@ -5823,15 +6550,15 @@
       </p:cxnSp>
       <p:cxnSp>
         <p:nvCxnSpPr>
-          <p:cNvPr id="175" name="Straight Arrow Connector 174"/>
+          <p:cNvPr id="160" name="Straight Arrow Connector 159"/>
           <p:cNvCxnSpPr>
-            <a:stCxn id="167" idx="1"/>
+            <a:stCxn id="148" idx="1"/>
           </p:cNvCxnSpPr>
           <p:nvPr/>
         </p:nvCxnSpPr>
         <p:spPr>
           <a:xfrm flipH="1">
-            <a:off x="838204" y="2118126"/>
+            <a:off x="838200" y="2285021"/>
             <a:ext cx="742447" cy="0"/>
           </a:xfrm>
           <a:prstGeom prst="straightConnector1">
@@ -5862,128 +6589,129 @@
           </a:fontRef>
         </p:style>
       </p:cxnSp>
-      <p:sp>
-        <p:nvSpPr>
-          <p:cNvPr id="176" name="TextBox 175"/>
-          <p:cNvSpPr txBox="1"/>
+      <p:cxnSp>
+        <p:nvCxnSpPr>
+          <p:cNvPr id="168" name="Straight Arrow Connector 167"/>
+          <p:cNvCxnSpPr>
+            <a:stCxn id="51" idx="3"/>
+          </p:cNvCxnSpPr>
           <p:nvPr/>
-        </p:nvSpPr>
-        <p:spPr>
-          <a:xfrm>
-            <a:off x="304800" y="4781075"/>
-            <a:ext cx="838200" cy="426719"/>
-          </a:xfrm>
-          <a:prstGeom prst="rect">
-            <a:avLst/>
-          </a:prstGeom>
-          <a:grpFill/>
-          <a:ln>
-            <a:noFill/>
+        </p:nvCxnSpPr>
+        <p:spPr>
+          <a:xfrm>
+            <a:off x="7550032" y="6467889"/>
+            <a:ext cx="540000" cy="0"/>
+          </a:xfrm>
+          <a:prstGeom prst="straightConnector1">
+            <a:avLst/>
+          </a:prstGeom>
+          <a:ln w="38100">
+            <a:solidFill>
+              <a:schemeClr val="accent3">
+                <a:lumMod val="75000"/>
+              </a:schemeClr>
+            </a:solidFill>
+            <a:prstDash val="sysDash"/>
+            <a:tailEnd type="arrow"/>
           </a:ln>
         </p:spPr>
         <p:style>
-          <a:lnRef idx="2">
-            <a:schemeClr val="accent1">
-              <a:shade val="50000"/>
-            </a:schemeClr>
+          <a:lnRef idx="1">
+            <a:schemeClr val="accent1"/>
           </a:lnRef>
-          <a:fillRef idx="1">
+          <a:fillRef idx="0">
             <a:schemeClr val="accent1"/>
           </a:fillRef>
           <a:effectRef idx="0">
             <a:schemeClr val="accent1"/>
           </a:effectRef>
           <a:fontRef idx="minor">
-            <a:schemeClr val="lt1"/>
+            <a:schemeClr val="tx1"/>
           </a:fontRef>
         </p:style>
-        <p:txBody>
-          <a:bodyPr rtlCol="0" anchor="ctr" anchorCtr="0"/>
-          <a:lstStyle>
-            <a:defPPr>
-              <a:defRPr lang="en-US"/>
-            </a:defPPr>
-            <a:lvl1pPr>
-              <a:defRPr sz="1400" b="1">
-                <a:solidFill>
-                  <a:srgbClr val="7030A0"/>
-                </a:solidFill>
-              </a:defRPr>
-            </a:lvl1pPr>
-            <a:lvl2pPr>
-              <a:defRPr>
-                <a:solidFill>
-                  <a:schemeClr val="lt1"/>
-                </a:solidFill>
-              </a:defRPr>
-            </a:lvl2pPr>
-            <a:lvl3pPr>
-              <a:defRPr>
-                <a:solidFill>
-                  <a:schemeClr val="lt1"/>
-                </a:solidFill>
-              </a:defRPr>
-            </a:lvl3pPr>
-            <a:lvl4pPr>
-              <a:defRPr>
-                <a:solidFill>
-                  <a:schemeClr val="lt1"/>
-                </a:solidFill>
-              </a:defRPr>
-            </a:lvl4pPr>
-            <a:lvl5pPr>
-              <a:defRPr>
-                <a:solidFill>
-                  <a:schemeClr val="lt1"/>
-                </a:solidFill>
-              </a:defRPr>
-            </a:lvl5pPr>
-            <a:lvl6pPr>
-              <a:defRPr>
-                <a:solidFill>
-                  <a:schemeClr val="lt1"/>
-                </a:solidFill>
-              </a:defRPr>
-            </a:lvl6pPr>
-            <a:lvl7pPr>
-              <a:defRPr>
-                <a:solidFill>
-                  <a:schemeClr val="lt1"/>
-                </a:solidFill>
-              </a:defRPr>
-            </a:lvl7pPr>
-            <a:lvl8pPr>
-              <a:defRPr>
-                <a:solidFill>
-                  <a:schemeClr val="lt1"/>
-                </a:solidFill>
-              </a:defRPr>
-            </a:lvl8pPr>
-            <a:lvl9pPr>
-              <a:defRPr>
-                <a:solidFill>
-                  <a:schemeClr val="lt1"/>
-                </a:solidFill>
-              </a:defRPr>
-            </a:lvl9pPr>
-          </a:lstStyle>
-          <a:p>
-            <a:r>
-              <a:rPr lang="en-US" sz="1600" dirty="0" smtClean="0">
-                <a:solidFill>
-                  <a:schemeClr val="tx1"/>
-                </a:solidFill>
-              </a:rPr>
-              <a:t>Test Driver</a:t>
-            </a:r>
-            <a:endParaRPr lang="en-SG" sz="1600" dirty="0">
-              <a:solidFill>
-                <a:schemeClr val="tx1"/>
-              </a:solidFill>
-            </a:endParaRPr>
-          </a:p>
-        </p:txBody>
-      </p:sp>
+      </p:cxnSp>
+      <p:cxnSp>
+        <p:nvCxnSpPr>
+          <p:cNvPr id="3" name="Elbow Connector 2"/>
+          <p:cNvCxnSpPr>
+            <a:stCxn id="127" idx="1"/>
+            <a:endCxn id="112" idx="2"/>
+          </p:cNvCxnSpPr>
+          <p:nvPr/>
+        </p:nvCxnSpPr>
+        <p:spPr>
+          <a:xfrm rot="10800000">
+            <a:off x="2315192" y="6647890"/>
+            <a:ext cx="275608" cy="741875"/>
+          </a:xfrm>
+          <a:prstGeom prst="bentConnector2">
+            <a:avLst/>
+          </a:prstGeom>
+          <a:ln w="38100">
+            <a:solidFill>
+              <a:schemeClr val="tx1"/>
+            </a:solidFill>
+            <a:prstDash val="sysDash"/>
+            <a:headEnd type="none" w="med" len="med"/>
+            <a:tailEnd type="arrow" w="med" len="med"/>
+          </a:ln>
+        </p:spPr>
+        <p:style>
+          <a:lnRef idx="1">
+            <a:schemeClr val="accent1"/>
+          </a:lnRef>
+          <a:fillRef idx="0">
+            <a:schemeClr val="accent1"/>
+          </a:fillRef>
+          <a:effectRef idx="0">
+            <a:schemeClr val="accent1"/>
+          </a:effectRef>
+          <a:fontRef idx="minor">
+            <a:schemeClr val="tx1"/>
+          </a:fontRef>
+        </p:style>
+      </p:cxnSp>
+      <p:cxnSp>
+        <p:nvCxnSpPr>
+          <p:cNvPr id="5" name="Elbow Connector 4"/>
+          <p:cNvCxnSpPr>
+            <a:stCxn id="127" idx="3"/>
+            <a:endCxn id="52" idx="2"/>
+          </p:cNvCxnSpPr>
+          <p:nvPr/>
+        </p:nvCxnSpPr>
+        <p:spPr>
+          <a:xfrm flipV="1">
+            <a:off x="4191000" y="6647889"/>
+            <a:ext cx="283200" cy="741875"/>
+          </a:xfrm>
+          <a:prstGeom prst="bentConnector2">
+            <a:avLst/>
+          </a:prstGeom>
+          <a:ln w="38100">
+            <a:solidFill>
+              <a:schemeClr val="tx1"/>
+            </a:solidFill>
+            <a:prstDash val="sysDash"/>
+            <a:headEnd type="none" w="med" len="med"/>
+            <a:tailEnd type="arrow" w="med" len="med"/>
+          </a:ln>
+        </p:spPr>
+        <p:style>
+          <a:lnRef idx="1">
+            <a:schemeClr val="accent1"/>
+          </a:lnRef>
+          <a:fillRef idx="0">
+            <a:schemeClr val="accent1"/>
+          </a:fillRef>
+          <a:effectRef idx="0">
+            <a:schemeClr val="accent1"/>
+          </a:effectRef>
+          <a:fontRef idx="minor">
+            <a:schemeClr val="tx1"/>
+          </a:fontRef>
+        </p:style>
+      </p:cxnSp>
     </p:spTree>
     <p:extLst>
       <p:ext uri="{BB962C8B-B14F-4D97-AF65-F5344CB8AC3E}">

</xml_diff>

<commit_message>
[#9079] Add skeleton pages (#9195)
* Create DataBundleLogic to contain functions related to DataBundle as a whole

* Remove logic.backdoor package for good

The only usages are in BackDoor class. They are safely replaced with a placeholder string
as BackDoor is only used in now-defunct UI tests.

* Rename UserType to UserInfo

The said object also includes the user ID, which means "type" is not 100% accurate.

* Change references of PostParameter to HttpParameter

* Use generics superclass for automated action tests

* Add architecture rule to limit usage of Assertion API

* Move scalabilitytests to e2e

* Update package diagrams

* Rename XSRF -> CSRF and extract constants

* Make loginUser method in GaeSimulation private

* Add necessary structures to Action class

* Extract URIs into constants

* Add architectural rules for E2E and new controller classes

* Add student pages skeleton

* Add admin pages skeleton

* Add instructor pages skeleton

* Add remaining pages skeleton
</commit_message>
<xml_diff>
--- a/docs/images/LogicComponent.pptx
+++ b/docs/images/LogicComponent.pptx
@@ -214,7 +214,7 @@
           <a:p>
             <a:fld id="{AC0A4F7A-2FF6-4B0C-9CFC-82AE92BD66AF}" type="datetimeFigureOut">
               <a:rPr lang="en-AU" smtClean="0"/>
-              <a:t>17/09/2018</a:t>
+              <a:t>27/09/2018</a:t>
             </a:fld>
             <a:endParaRPr lang="en-AU"/>
           </a:p>
@@ -380,7 +380,7 @@
             <a:fld id="{AF301891-4E62-472A-98E9-95DBD40531A4}" type="datetimeFigureOut">
               <a:rPr lang="en-SG" smtClean="0"/>
               <a:pPr/>
-              <a:t>17/9/2018</a:t>
+              <a:t>27/9/2018</a:t>
             </a:fld>
             <a:endParaRPr lang="en-SG"/>
           </a:p>
@@ -935,7 +935,7 @@
             <a:fld id="{1D8BD707-D9CF-40AE-B4C6-C98DA3205C09}" type="datetimeFigureOut">
               <a:rPr lang="en-US" smtClean="0"/>
               <a:pPr/>
-              <a:t>9/17/2018</a:t>
+              <a:t>9/27/2018</a:t>
             </a:fld>
             <a:endParaRPr lang="en-US"/>
           </a:p>
@@ -1149,7 +1149,7 @@
             <a:fld id="{1D8BD707-D9CF-40AE-B4C6-C98DA3205C09}" type="datetimeFigureOut">
               <a:rPr lang="en-US" smtClean="0"/>
               <a:pPr/>
-              <a:t>9/17/2018</a:t>
+              <a:t>9/27/2018</a:t>
             </a:fld>
             <a:endParaRPr lang="en-US"/>
           </a:p>
@@ -1356,7 +1356,7 @@
             <a:fld id="{1D8BD707-D9CF-40AE-B4C6-C98DA3205C09}" type="datetimeFigureOut">
               <a:rPr lang="en-US" smtClean="0"/>
               <a:pPr/>
-              <a:t>9/17/2018</a:t>
+              <a:t>9/27/2018</a:t>
             </a:fld>
             <a:endParaRPr lang="en-US"/>
           </a:p>
@@ -1563,7 +1563,7 @@
             <a:fld id="{1D8BD707-D9CF-40AE-B4C6-C98DA3205C09}" type="datetimeFigureOut">
               <a:rPr lang="en-US" smtClean="0"/>
               <a:pPr/>
-              <a:t>9/17/2018</a:t>
+              <a:t>9/27/2018</a:t>
             </a:fld>
             <a:endParaRPr lang="en-US"/>
           </a:p>
@@ -1836,7 +1836,7 @@
             <a:fld id="{1D8BD707-D9CF-40AE-B4C6-C98DA3205C09}" type="datetimeFigureOut">
               <a:rPr lang="en-US" smtClean="0"/>
               <a:pPr/>
-              <a:t>9/17/2018</a:t>
+              <a:t>9/27/2018</a:t>
             </a:fld>
             <a:endParaRPr lang="en-US"/>
           </a:p>
@@ -2159,7 +2159,7 @@
             <a:fld id="{1D8BD707-D9CF-40AE-B4C6-C98DA3205C09}" type="datetimeFigureOut">
               <a:rPr lang="en-US" smtClean="0"/>
               <a:pPr/>
-              <a:t>9/17/2018</a:t>
+              <a:t>9/27/2018</a:t>
             </a:fld>
             <a:endParaRPr lang="en-US"/>
           </a:p>
@@ -2622,7 +2622,7 @@
             <a:fld id="{1D8BD707-D9CF-40AE-B4C6-C98DA3205C09}" type="datetimeFigureOut">
               <a:rPr lang="en-US" smtClean="0"/>
               <a:pPr/>
-              <a:t>9/17/2018</a:t>
+              <a:t>9/27/2018</a:t>
             </a:fld>
             <a:endParaRPr lang="en-US"/>
           </a:p>
@@ -2769,7 +2769,7 @@
             <a:fld id="{1D8BD707-D9CF-40AE-B4C6-C98DA3205C09}" type="datetimeFigureOut">
               <a:rPr lang="en-US" smtClean="0"/>
               <a:pPr/>
-              <a:t>9/17/2018</a:t>
+              <a:t>9/27/2018</a:t>
             </a:fld>
             <a:endParaRPr lang="en-US"/>
           </a:p>
@@ -2885,7 +2885,7 @@
             <a:fld id="{1D8BD707-D9CF-40AE-B4C6-C98DA3205C09}" type="datetimeFigureOut">
               <a:rPr lang="en-US" smtClean="0"/>
               <a:pPr/>
-              <a:t>9/17/2018</a:t>
+              <a:t>9/27/2018</a:t>
             </a:fld>
             <a:endParaRPr lang="en-US"/>
           </a:p>
@@ -3192,7 +3192,7 @@
             <a:fld id="{1D8BD707-D9CF-40AE-B4C6-C98DA3205C09}" type="datetimeFigureOut">
               <a:rPr lang="en-US" smtClean="0"/>
               <a:pPr/>
-              <a:t>9/17/2018</a:t>
+              <a:t>9/27/2018</a:t>
             </a:fld>
             <a:endParaRPr lang="en-US"/>
           </a:p>
@@ -3475,7 +3475,7 @@
             <a:fld id="{1D8BD707-D9CF-40AE-B4C6-C98DA3205C09}" type="datetimeFigureOut">
               <a:rPr lang="en-US" smtClean="0"/>
               <a:pPr/>
-              <a:t>9/17/2018</a:t>
+              <a:t>9/27/2018</a:t>
             </a:fld>
             <a:endParaRPr lang="en-US"/>
           </a:p>
@@ -5862,128 +5862,6 @@
           </a:fontRef>
         </p:style>
       </p:cxnSp>
-      <p:sp>
-        <p:nvSpPr>
-          <p:cNvPr id="176" name="TextBox 175"/>
-          <p:cNvSpPr txBox="1"/>
-          <p:nvPr/>
-        </p:nvSpPr>
-        <p:spPr>
-          <a:xfrm>
-            <a:off x="304800" y="4781075"/>
-            <a:ext cx="838200" cy="426719"/>
-          </a:xfrm>
-          <a:prstGeom prst="rect">
-            <a:avLst/>
-          </a:prstGeom>
-          <a:grpFill/>
-          <a:ln>
-            <a:noFill/>
-          </a:ln>
-        </p:spPr>
-        <p:style>
-          <a:lnRef idx="2">
-            <a:schemeClr val="accent1">
-              <a:shade val="50000"/>
-            </a:schemeClr>
-          </a:lnRef>
-          <a:fillRef idx="1">
-            <a:schemeClr val="accent1"/>
-          </a:fillRef>
-          <a:effectRef idx="0">
-            <a:schemeClr val="accent1"/>
-          </a:effectRef>
-          <a:fontRef idx="minor">
-            <a:schemeClr val="lt1"/>
-          </a:fontRef>
-        </p:style>
-        <p:txBody>
-          <a:bodyPr rtlCol="0" anchor="ctr" anchorCtr="0"/>
-          <a:lstStyle>
-            <a:defPPr>
-              <a:defRPr lang="en-US"/>
-            </a:defPPr>
-            <a:lvl1pPr>
-              <a:defRPr sz="1400" b="1">
-                <a:solidFill>
-                  <a:srgbClr val="7030A0"/>
-                </a:solidFill>
-              </a:defRPr>
-            </a:lvl1pPr>
-            <a:lvl2pPr>
-              <a:defRPr>
-                <a:solidFill>
-                  <a:schemeClr val="lt1"/>
-                </a:solidFill>
-              </a:defRPr>
-            </a:lvl2pPr>
-            <a:lvl3pPr>
-              <a:defRPr>
-                <a:solidFill>
-                  <a:schemeClr val="lt1"/>
-                </a:solidFill>
-              </a:defRPr>
-            </a:lvl3pPr>
-            <a:lvl4pPr>
-              <a:defRPr>
-                <a:solidFill>
-                  <a:schemeClr val="lt1"/>
-                </a:solidFill>
-              </a:defRPr>
-            </a:lvl4pPr>
-            <a:lvl5pPr>
-              <a:defRPr>
-                <a:solidFill>
-                  <a:schemeClr val="lt1"/>
-                </a:solidFill>
-              </a:defRPr>
-            </a:lvl5pPr>
-            <a:lvl6pPr>
-              <a:defRPr>
-                <a:solidFill>
-                  <a:schemeClr val="lt1"/>
-                </a:solidFill>
-              </a:defRPr>
-            </a:lvl6pPr>
-            <a:lvl7pPr>
-              <a:defRPr>
-                <a:solidFill>
-                  <a:schemeClr val="lt1"/>
-                </a:solidFill>
-              </a:defRPr>
-            </a:lvl7pPr>
-            <a:lvl8pPr>
-              <a:defRPr>
-                <a:solidFill>
-                  <a:schemeClr val="lt1"/>
-                </a:solidFill>
-              </a:defRPr>
-            </a:lvl8pPr>
-            <a:lvl9pPr>
-              <a:defRPr>
-                <a:solidFill>
-                  <a:schemeClr val="lt1"/>
-                </a:solidFill>
-              </a:defRPr>
-            </a:lvl9pPr>
-          </a:lstStyle>
-          <a:p>
-            <a:r>
-              <a:rPr lang="en-US" sz="1600" dirty="0" smtClean="0">
-                <a:solidFill>
-                  <a:schemeClr val="tx1"/>
-                </a:solidFill>
-              </a:rPr>
-              <a:t>Test Driver</a:t>
-            </a:r>
-            <a:endParaRPr lang="en-SG" sz="1600" dirty="0">
-              <a:solidFill>
-                <a:schemeClr val="tx1"/>
-              </a:solidFill>
-            </a:endParaRPr>
-          </a:p>
-        </p:txBody>
-      </p:sp>
     </p:spTree>
     <p:extLst>
       <p:ext uri="{BB962C8B-B14F-4D97-AF65-F5344CB8AC3E}">

</xml_diff>

<commit_message>
Revert "[#9079] Add skeleton pages (#9195)"
This reverts commit 3e5ae65e0d7969f7e6ded4a6666d8ae43f5dafd3.
</commit_message>
<xml_diff>
--- a/docs/images/LogicComponent.pptx
+++ b/docs/images/LogicComponent.pptx
@@ -214,7 +214,7 @@
           <a:p>
             <a:fld id="{AC0A4F7A-2FF6-4B0C-9CFC-82AE92BD66AF}" type="datetimeFigureOut">
               <a:rPr lang="en-AU" smtClean="0"/>
-              <a:t>27/09/2018</a:t>
+              <a:t>17/09/2018</a:t>
             </a:fld>
             <a:endParaRPr lang="en-AU"/>
           </a:p>
@@ -380,7 +380,7 @@
             <a:fld id="{AF301891-4E62-472A-98E9-95DBD40531A4}" type="datetimeFigureOut">
               <a:rPr lang="en-SG" smtClean="0"/>
               <a:pPr/>
-              <a:t>27/9/2018</a:t>
+              <a:t>17/9/2018</a:t>
             </a:fld>
             <a:endParaRPr lang="en-SG"/>
           </a:p>
@@ -935,7 +935,7 @@
             <a:fld id="{1D8BD707-D9CF-40AE-B4C6-C98DA3205C09}" type="datetimeFigureOut">
               <a:rPr lang="en-US" smtClean="0"/>
               <a:pPr/>
-              <a:t>9/27/2018</a:t>
+              <a:t>9/17/2018</a:t>
             </a:fld>
             <a:endParaRPr lang="en-US"/>
           </a:p>
@@ -1149,7 +1149,7 @@
             <a:fld id="{1D8BD707-D9CF-40AE-B4C6-C98DA3205C09}" type="datetimeFigureOut">
               <a:rPr lang="en-US" smtClean="0"/>
               <a:pPr/>
-              <a:t>9/27/2018</a:t>
+              <a:t>9/17/2018</a:t>
             </a:fld>
             <a:endParaRPr lang="en-US"/>
           </a:p>
@@ -1356,7 +1356,7 @@
             <a:fld id="{1D8BD707-D9CF-40AE-B4C6-C98DA3205C09}" type="datetimeFigureOut">
               <a:rPr lang="en-US" smtClean="0"/>
               <a:pPr/>
-              <a:t>9/27/2018</a:t>
+              <a:t>9/17/2018</a:t>
             </a:fld>
             <a:endParaRPr lang="en-US"/>
           </a:p>
@@ -1563,7 +1563,7 @@
             <a:fld id="{1D8BD707-D9CF-40AE-B4C6-C98DA3205C09}" type="datetimeFigureOut">
               <a:rPr lang="en-US" smtClean="0"/>
               <a:pPr/>
-              <a:t>9/27/2018</a:t>
+              <a:t>9/17/2018</a:t>
             </a:fld>
             <a:endParaRPr lang="en-US"/>
           </a:p>
@@ -1836,7 +1836,7 @@
             <a:fld id="{1D8BD707-D9CF-40AE-B4C6-C98DA3205C09}" type="datetimeFigureOut">
               <a:rPr lang="en-US" smtClean="0"/>
               <a:pPr/>
-              <a:t>9/27/2018</a:t>
+              <a:t>9/17/2018</a:t>
             </a:fld>
             <a:endParaRPr lang="en-US"/>
           </a:p>
@@ -2159,7 +2159,7 @@
             <a:fld id="{1D8BD707-D9CF-40AE-B4C6-C98DA3205C09}" type="datetimeFigureOut">
               <a:rPr lang="en-US" smtClean="0"/>
               <a:pPr/>
-              <a:t>9/27/2018</a:t>
+              <a:t>9/17/2018</a:t>
             </a:fld>
             <a:endParaRPr lang="en-US"/>
           </a:p>
@@ -2622,7 +2622,7 @@
             <a:fld id="{1D8BD707-D9CF-40AE-B4C6-C98DA3205C09}" type="datetimeFigureOut">
               <a:rPr lang="en-US" smtClean="0"/>
               <a:pPr/>
-              <a:t>9/27/2018</a:t>
+              <a:t>9/17/2018</a:t>
             </a:fld>
             <a:endParaRPr lang="en-US"/>
           </a:p>
@@ -2769,7 +2769,7 @@
             <a:fld id="{1D8BD707-D9CF-40AE-B4C6-C98DA3205C09}" type="datetimeFigureOut">
               <a:rPr lang="en-US" smtClean="0"/>
               <a:pPr/>
-              <a:t>9/27/2018</a:t>
+              <a:t>9/17/2018</a:t>
             </a:fld>
             <a:endParaRPr lang="en-US"/>
           </a:p>
@@ -2885,7 +2885,7 @@
             <a:fld id="{1D8BD707-D9CF-40AE-B4C6-C98DA3205C09}" type="datetimeFigureOut">
               <a:rPr lang="en-US" smtClean="0"/>
               <a:pPr/>
-              <a:t>9/27/2018</a:t>
+              <a:t>9/17/2018</a:t>
             </a:fld>
             <a:endParaRPr lang="en-US"/>
           </a:p>
@@ -3192,7 +3192,7 @@
             <a:fld id="{1D8BD707-D9CF-40AE-B4C6-C98DA3205C09}" type="datetimeFigureOut">
               <a:rPr lang="en-US" smtClean="0"/>
               <a:pPr/>
-              <a:t>9/27/2018</a:t>
+              <a:t>9/17/2018</a:t>
             </a:fld>
             <a:endParaRPr lang="en-US"/>
           </a:p>
@@ -3475,7 +3475,7 @@
             <a:fld id="{1D8BD707-D9CF-40AE-B4C6-C98DA3205C09}" type="datetimeFigureOut">
               <a:rPr lang="en-US" smtClean="0"/>
               <a:pPr/>
-              <a:t>9/27/2018</a:t>
+              <a:t>9/17/2018</a:t>
             </a:fld>
             <a:endParaRPr lang="en-US"/>
           </a:p>
@@ -5862,6 +5862,128 @@
           </a:fontRef>
         </p:style>
       </p:cxnSp>
+      <p:sp>
+        <p:nvSpPr>
+          <p:cNvPr id="176" name="TextBox 175"/>
+          <p:cNvSpPr txBox="1"/>
+          <p:nvPr/>
+        </p:nvSpPr>
+        <p:spPr>
+          <a:xfrm>
+            <a:off x="304800" y="4781075"/>
+            <a:ext cx="838200" cy="426719"/>
+          </a:xfrm>
+          <a:prstGeom prst="rect">
+            <a:avLst/>
+          </a:prstGeom>
+          <a:grpFill/>
+          <a:ln>
+            <a:noFill/>
+          </a:ln>
+        </p:spPr>
+        <p:style>
+          <a:lnRef idx="2">
+            <a:schemeClr val="accent1">
+              <a:shade val="50000"/>
+            </a:schemeClr>
+          </a:lnRef>
+          <a:fillRef idx="1">
+            <a:schemeClr val="accent1"/>
+          </a:fillRef>
+          <a:effectRef idx="0">
+            <a:schemeClr val="accent1"/>
+          </a:effectRef>
+          <a:fontRef idx="minor">
+            <a:schemeClr val="lt1"/>
+          </a:fontRef>
+        </p:style>
+        <p:txBody>
+          <a:bodyPr rtlCol="0" anchor="ctr" anchorCtr="0"/>
+          <a:lstStyle>
+            <a:defPPr>
+              <a:defRPr lang="en-US"/>
+            </a:defPPr>
+            <a:lvl1pPr>
+              <a:defRPr sz="1400" b="1">
+                <a:solidFill>
+                  <a:srgbClr val="7030A0"/>
+                </a:solidFill>
+              </a:defRPr>
+            </a:lvl1pPr>
+            <a:lvl2pPr>
+              <a:defRPr>
+                <a:solidFill>
+                  <a:schemeClr val="lt1"/>
+                </a:solidFill>
+              </a:defRPr>
+            </a:lvl2pPr>
+            <a:lvl3pPr>
+              <a:defRPr>
+                <a:solidFill>
+                  <a:schemeClr val="lt1"/>
+                </a:solidFill>
+              </a:defRPr>
+            </a:lvl3pPr>
+            <a:lvl4pPr>
+              <a:defRPr>
+                <a:solidFill>
+                  <a:schemeClr val="lt1"/>
+                </a:solidFill>
+              </a:defRPr>
+            </a:lvl4pPr>
+            <a:lvl5pPr>
+              <a:defRPr>
+                <a:solidFill>
+                  <a:schemeClr val="lt1"/>
+                </a:solidFill>
+              </a:defRPr>
+            </a:lvl5pPr>
+            <a:lvl6pPr>
+              <a:defRPr>
+                <a:solidFill>
+                  <a:schemeClr val="lt1"/>
+                </a:solidFill>
+              </a:defRPr>
+            </a:lvl6pPr>
+            <a:lvl7pPr>
+              <a:defRPr>
+                <a:solidFill>
+                  <a:schemeClr val="lt1"/>
+                </a:solidFill>
+              </a:defRPr>
+            </a:lvl7pPr>
+            <a:lvl8pPr>
+              <a:defRPr>
+                <a:solidFill>
+                  <a:schemeClr val="lt1"/>
+                </a:solidFill>
+              </a:defRPr>
+            </a:lvl8pPr>
+            <a:lvl9pPr>
+              <a:defRPr>
+                <a:solidFill>
+                  <a:schemeClr val="lt1"/>
+                </a:solidFill>
+              </a:defRPr>
+            </a:lvl9pPr>
+          </a:lstStyle>
+          <a:p>
+            <a:r>
+              <a:rPr lang="en-US" sz="1600" dirty="0" smtClean="0">
+                <a:solidFill>
+                  <a:schemeClr val="tx1"/>
+                </a:solidFill>
+              </a:rPr>
+              <a:t>Test Driver</a:t>
+            </a:r>
+            <a:endParaRPr lang="en-SG" sz="1600" dirty="0">
+              <a:solidFill>
+                <a:schemeClr val="tx1"/>
+              </a:solidFill>
+            </a:endParaRPr>
+          </a:p>
+        </p:txBody>
+      </p:sp>
     </p:spTree>
     <p:extLst>
       <p:ext uri="{BB962C8B-B14F-4D97-AF65-F5344CB8AC3E}">

</xml_diff>